<commit_message>
the actual end of saturday
</commit_message>
<xml_diff>
--- a/Page 1.pptx
+++ b/Page 1.pptx
@@ -109,6 +109,11 @@
       </a:defRPr>
     </a:lvl9pPr>
   </p:defaultTextStyle>
+  <p:extLst>
+    <p:ext uri="{EFAFB233-063F-42B5-8137-9DF3F51BA10A}">
+      <p15:sldGuideLst xmlns:p15="http://schemas.microsoft.com/office/powerpoint/2012/main"/>
+    </p:ext>
+  </p:extLst>
 </p:presentation>
 </file>
 
@@ -194,7 +199,7 @@
           <a:p>
             <a:fld id="{28C9ED5D-7977-43D5-9955-3FD59D31A492}" type="datetimeFigureOut">
               <a:rPr lang="en-GB" smtClean="0"/>
-              <a:t>07/03/2020</a:t>
+              <a:t>08/03/2020</a:t>
             </a:fld>
             <a:endParaRPr lang="en-GB"/>
           </a:p>
@@ -588,7 +593,10 @@
               <a:buFont typeface="Arial" panose="020B0604020202020204" pitchFamily="34" charset="0"/>
               <a:buChar char="•"/>
             </a:pPr>
-            <a:endParaRPr lang="en-GB" dirty="0"/>
+            <a:r>
+              <a:rPr lang="en-GB" dirty="0"/>
+              <a:t>SO HERE WE GO</a:t>
+            </a:r>
           </a:p>
           <a:p>
             <a:pPr marL="171450" indent="-171450">
@@ -599,6 +607,23 @@
               <a:rPr lang="en-GB" dirty="0"/>
               <a:t>Then I thought, what would be most interesting to look into and I thought, why not the one that has the worst success rate</a:t>
             </a:r>
+          </a:p>
+          <a:p>
+            <a:pPr marL="171450" indent="-171450">
+              <a:buFont typeface="Arial" panose="020B0604020202020204" pitchFamily="34" charset="0"/>
+              <a:buChar char="•"/>
+            </a:pPr>
+            <a:r>
+              <a:rPr lang="en-GB" dirty="0"/>
+              <a:t>WITH A TREMENDOUS 80% failure rate, lets talk about tech</a:t>
+            </a:r>
+          </a:p>
+          <a:p>
+            <a:pPr marL="171450" indent="-171450">
+              <a:buFont typeface="Arial" panose="020B0604020202020204" pitchFamily="34" charset="0"/>
+              <a:buChar char="•"/>
+            </a:pPr>
+            <a:endParaRPr lang="en-GB" dirty="0"/>
           </a:p>
         </p:txBody>
       </p:sp>
@@ -688,6 +713,134 @@
             </a:pPr>
             <a:r>
               <a:rPr lang="en-GB" dirty="0"/>
+              <a:t>So lets look at the categories within tech</a:t>
+            </a:r>
+          </a:p>
+          <a:p>
+            <a:pPr marL="171450" indent="-171450">
+              <a:buFont typeface="Arial" panose="020B0604020202020204" pitchFamily="34" charset="0"/>
+              <a:buChar char="•"/>
+            </a:pPr>
+            <a:r>
+              <a:rPr lang="en-GB" dirty="0"/>
+              <a:t>As we can see, its across the board pretty consistently unsuccessful in all of the subcategories </a:t>
+            </a:r>
+          </a:p>
+          <a:p>
+            <a:pPr marL="171450" indent="-171450">
+              <a:buFont typeface="Arial" panose="020B0604020202020204" pitchFamily="34" charset="0"/>
+              <a:buChar char="•"/>
+            </a:pPr>
+            <a:r>
+              <a:rPr lang="en-GB" dirty="0"/>
+              <a:t>And somehow, it would appear we are more successful in space exploration, than in apps, remarkable</a:t>
+            </a:r>
+          </a:p>
+          <a:p>
+            <a:pPr marL="171450" indent="-171450">
+              <a:buFont typeface="Arial" panose="020B0604020202020204" pitchFamily="34" charset="0"/>
+              <a:buChar char="•"/>
+            </a:pPr>
+            <a:r>
+              <a:rPr lang="en-GB" dirty="0"/>
+              <a:t>Mention how like its maybe not the categories fault, maybe it’s the type of people who are committing to these projects</a:t>
+            </a:r>
+          </a:p>
+          <a:p>
+            <a:pPr marL="171450" indent="-171450">
+              <a:buFont typeface="Arial" panose="020B0604020202020204" pitchFamily="34" charset="0"/>
+              <a:buChar char="•"/>
+            </a:pPr>
+            <a:endParaRPr lang="en-GB" dirty="0"/>
+          </a:p>
+        </p:txBody>
+      </p:sp>
+      <p:sp>
+        <p:nvSpPr>
+          <p:cNvPr id="4" name="Slide Number Placeholder 3"/>
+          <p:cNvSpPr>
+            <a:spLocks noGrp="1"/>
+          </p:cNvSpPr>
+          <p:nvPr>
+            <p:ph type="sldNum" sz="quarter" idx="5"/>
+          </p:nvPr>
+        </p:nvSpPr>
+        <p:spPr/>
+        <p:txBody>
+          <a:bodyPr/>
+          <a:lstStyle/>
+          <a:p>
+            <a:fld id="{C2790DFA-B98D-46A3-A997-8D3A39E1F485}" type="slidenum">
+              <a:rPr lang="en-GB" smtClean="0"/>
+              <a:t>2</a:t>
+            </a:fld>
+            <a:endParaRPr lang="en-GB"/>
+          </a:p>
+        </p:txBody>
+      </p:sp>
+    </p:spTree>
+    <p:extLst>
+      <p:ext uri="{BB962C8B-B14F-4D97-AF65-F5344CB8AC3E}">
+        <p14:creationId xmlns:p14="http://schemas.microsoft.com/office/powerpoint/2010/main" val="660280902"/>
+      </p:ext>
+    </p:extLst>
+  </p:cSld>
+  <p:clrMapOvr>
+    <a:masterClrMapping/>
+  </p:clrMapOvr>
+</p:notes>
+</file>
+
+<file path=ppt/notesSlides/notesSlide3.xml><?xml version="1.0" encoding="utf-8"?>
+<p:notes xmlns:a="http://schemas.openxmlformats.org/drawingml/2006/main" xmlns:r="http://schemas.openxmlformats.org/officeDocument/2006/relationships" xmlns:p="http://schemas.openxmlformats.org/presentationml/2006/main">
+  <p:cSld>
+    <p:spTree>
+      <p:nvGrpSpPr>
+        <p:cNvPr id="1" name=""/>
+        <p:cNvGrpSpPr/>
+        <p:nvPr/>
+      </p:nvGrpSpPr>
+      <p:grpSpPr>
+        <a:xfrm>
+          <a:off x="0" y="0"/>
+          <a:ext cx="0" cy="0"/>
+          <a:chOff x="0" y="0"/>
+          <a:chExt cx="0" cy="0"/>
+        </a:xfrm>
+      </p:grpSpPr>
+      <p:sp>
+        <p:nvSpPr>
+          <p:cNvPr id="2" name="Slide Image Placeholder 1"/>
+          <p:cNvSpPr>
+            <a:spLocks noGrp="1" noRot="1" noChangeAspect="1"/>
+          </p:cNvSpPr>
+          <p:nvPr>
+            <p:ph type="sldImg"/>
+          </p:nvPr>
+        </p:nvSpPr>
+        <p:spPr/>
+      </p:sp>
+      <p:sp>
+        <p:nvSpPr>
+          <p:cNvPr id="3" name="Notes Placeholder 2"/>
+          <p:cNvSpPr>
+            <a:spLocks noGrp="1"/>
+          </p:cNvSpPr>
+          <p:nvPr>
+            <p:ph type="body" idx="1"/>
+          </p:nvPr>
+        </p:nvSpPr>
+        <p:spPr/>
+        <p:txBody>
+          <a:bodyPr/>
+          <a:lstStyle/>
+          <a:p>
+            <a:pPr marL="171450" indent="-171450">
+              <a:buFont typeface="Arial" panose="020B0604020202020204" pitchFamily="34" charset="0"/>
+              <a:buChar char="•"/>
+            </a:pPr>
+            <a:r>
+              <a:rPr lang="en-GB" dirty="0"/>
               <a:t>So at first I thought about checking to see if any of the dates were incorrect that would affect my data, these 7 records have a strange error, however they were all failures, so I thought id keep them in for any general counts etc, but if I did anything that was requiring a timescale, </a:t>
             </a:r>
             <a:r>
@@ -893,7 +1046,7 @@
           <a:p>
             <a:fld id="{DE1FCA93-C407-4EC4-8EA6-77C77783DF48}" type="datetimeFigureOut">
               <a:rPr lang="en-GB" smtClean="0"/>
-              <a:t>07/03/2020</a:t>
+              <a:t>08/03/2020</a:t>
             </a:fld>
             <a:endParaRPr lang="en-GB"/>
           </a:p>
@@ -1093,7 +1246,7 @@
           <a:p>
             <a:fld id="{DE1FCA93-C407-4EC4-8EA6-77C77783DF48}" type="datetimeFigureOut">
               <a:rPr lang="en-GB" smtClean="0"/>
-              <a:t>07/03/2020</a:t>
+              <a:t>08/03/2020</a:t>
             </a:fld>
             <a:endParaRPr lang="en-GB"/>
           </a:p>
@@ -1303,7 +1456,7 @@
           <a:p>
             <a:fld id="{DE1FCA93-C407-4EC4-8EA6-77C77783DF48}" type="datetimeFigureOut">
               <a:rPr lang="en-GB" smtClean="0"/>
-              <a:t>07/03/2020</a:t>
+              <a:t>08/03/2020</a:t>
             </a:fld>
             <a:endParaRPr lang="en-GB"/>
           </a:p>
@@ -1503,7 +1656,7 @@
           <a:p>
             <a:fld id="{DE1FCA93-C407-4EC4-8EA6-77C77783DF48}" type="datetimeFigureOut">
               <a:rPr lang="en-GB" smtClean="0"/>
-              <a:t>07/03/2020</a:t>
+              <a:t>08/03/2020</a:t>
             </a:fld>
             <a:endParaRPr lang="en-GB"/>
           </a:p>
@@ -1779,7 +1932,7 @@
           <a:p>
             <a:fld id="{DE1FCA93-C407-4EC4-8EA6-77C77783DF48}" type="datetimeFigureOut">
               <a:rPr lang="en-GB" smtClean="0"/>
-              <a:t>07/03/2020</a:t>
+              <a:t>08/03/2020</a:t>
             </a:fld>
             <a:endParaRPr lang="en-GB"/>
           </a:p>
@@ -2047,7 +2200,7 @@
           <a:p>
             <a:fld id="{DE1FCA93-C407-4EC4-8EA6-77C77783DF48}" type="datetimeFigureOut">
               <a:rPr lang="en-GB" smtClean="0"/>
-              <a:t>07/03/2020</a:t>
+              <a:t>08/03/2020</a:t>
             </a:fld>
             <a:endParaRPr lang="en-GB"/>
           </a:p>
@@ -2462,7 +2615,7 @@
           <a:p>
             <a:fld id="{DE1FCA93-C407-4EC4-8EA6-77C77783DF48}" type="datetimeFigureOut">
               <a:rPr lang="en-GB" smtClean="0"/>
-              <a:t>07/03/2020</a:t>
+              <a:t>08/03/2020</a:t>
             </a:fld>
             <a:endParaRPr lang="en-GB"/>
           </a:p>
@@ -2604,7 +2757,7 @@
           <a:p>
             <a:fld id="{DE1FCA93-C407-4EC4-8EA6-77C77783DF48}" type="datetimeFigureOut">
               <a:rPr lang="en-GB" smtClean="0"/>
-              <a:t>07/03/2020</a:t>
+              <a:t>08/03/2020</a:t>
             </a:fld>
             <a:endParaRPr lang="en-GB"/>
           </a:p>
@@ -2717,7 +2870,7 @@
           <a:p>
             <a:fld id="{DE1FCA93-C407-4EC4-8EA6-77C77783DF48}" type="datetimeFigureOut">
               <a:rPr lang="en-GB" smtClean="0"/>
-              <a:t>07/03/2020</a:t>
+              <a:t>08/03/2020</a:t>
             </a:fld>
             <a:endParaRPr lang="en-GB"/>
           </a:p>
@@ -3030,7 +3183,7 @@
           <a:p>
             <a:fld id="{DE1FCA93-C407-4EC4-8EA6-77C77783DF48}" type="datetimeFigureOut">
               <a:rPr lang="en-GB" smtClean="0"/>
-              <a:t>07/03/2020</a:t>
+              <a:t>08/03/2020</a:t>
             </a:fld>
             <a:endParaRPr lang="en-GB"/>
           </a:p>
@@ -3319,7 +3472,7 @@
           <a:p>
             <a:fld id="{DE1FCA93-C407-4EC4-8EA6-77C77783DF48}" type="datetimeFigureOut">
               <a:rPr lang="en-GB" smtClean="0"/>
-              <a:t>07/03/2020</a:t>
+              <a:t>08/03/2020</a:t>
             </a:fld>
             <a:endParaRPr lang="en-GB"/>
           </a:p>
@@ -3562,7 +3715,7 @@
           <a:p>
             <a:fld id="{DE1FCA93-C407-4EC4-8EA6-77C77783DF48}" type="datetimeFigureOut">
               <a:rPr lang="en-GB" smtClean="0"/>
-              <a:t>07/03/2020</a:t>
+              <a:t>08/03/2020</a:t>
             </a:fld>
             <a:endParaRPr lang="en-GB"/>
           </a:p>
@@ -4039,31 +4192,6 @@
       </p:grpSpPr>
       <p:sp>
         <p:nvSpPr>
-          <p:cNvPr id="2" name="Title 1">
-            <a:extLst>
-              <a:ext uri="{FF2B5EF4-FFF2-40B4-BE49-F238E27FC236}">
-                <a16:creationId xmlns:a16="http://schemas.microsoft.com/office/drawing/2014/main" id="{F16C4EA5-F8F1-4DB9-899D-9774A42FBD94}"/>
-              </a:ext>
-            </a:extLst>
-          </p:cNvPr>
-          <p:cNvSpPr>
-            <a:spLocks noGrp="1"/>
-          </p:cNvSpPr>
-          <p:nvPr>
-            <p:ph type="ctrTitle"/>
-          </p:nvPr>
-        </p:nvSpPr>
-        <p:spPr/>
-        <p:txBody>
-          <a:bodyPr/>
-          <a:lstStyle/>
-          <a:p>
-            <a:endParaRPr lang="en-GB"/>
-          </a:p>
-        </p:txBody>
-      </p:sp>
-      <p:sp>
-        <p:nvSpPr>
           <p:cNvPr id="3" name="Subtitle 2">
             <a:extLst>
               <a:ext uri="{FF2B5EF4-FFF2-40B4-BE49-F238E27FC236}">
@@ -4083,7 +4211,10 @@
           <a:bodyPr/>
           <a:lstStyle/>
           <a:p>
-            <a:endParaRPr lang="en-GB"/>
+            <a:r>
+              <a:rPr lang="en-GB" dirty="0"/>
+              <a:t>Tech zoom in</a:t>
+            </a:r>
           </a:p>
         </p:txBody>
       </p:sp>

</xml_diff>

<commit_message>
added integers instead of deltatime
</commit_message>
<xml_diff>
--- a/Page 1.pptx
+++ b/Page 1.pptx
@@ -8,9 +8,9 @@
     <p:notesMasterId r:id="rId5"/>
   </p:notesMasterIdLst>
   <p:sldIdLst>
-    <p:sldId id="258" r:id="rId2"/>
-    <p:sldId id="257" r:id="rId3"/>
-    <p:sldId id="256" r:id="rId4"/>
+    <p:sldId id="256" r:id="rId2"/>
+    <p:sldId id="258" r:id="rId3"/>
+    <p:sldId id="257" r:id="rId4"/>
   </p:sldIdLst>
   <p:sldSz cx="12192000" cy="6858000"/>
   <p:notesSz cx="6858000" cy="9144000"/>
@@ -517,7 +517,15 @@
             </a:pPr>
             <a:r>
               <a:rPr lang="en-GB" dirty="0"/>
-              <a:t>So initially I did some overall visualisations across the whole dataset to try and help me decide where to focus</a:t>
+              <a:t>So at first I thought about checking to see if any of the dates were incorrect that would affect my data, these 7 records have a strange error, however they were all failures, so I thought id keep them in for any general counts etc, but if I did anything that was requiring a timescale, </a:t>
+            </a:r>
+            <a:r>
+              <a:rPr lang="en-GB" dirty="0" err="1"/>
+              <a:t>i’d</a:t>
+            </a:r>
+            <a:r>
+              <a:rPr lang="en-GB" dirty="0"/>
+              <a:t> remove them </a:t>
             </a:r>
           </a:p>
           <a:p>
@@ -527,7 +535,7 @@
             </a:pPr>
             <a:r>
               <a:rPr lang="en-GB" dirty="0"/>
-              <a:t>I decided not to consider the live projects, as we don’t know whether they were successful or not </a:t>
+              <a:t>Then there was the undefined state type, which all had null values for the pledge amount and no country</a:t>
             </a:r>
           </a:p>
           <a:p>
@@ -537,15 +545,7 @@
             </a:pPr>
             <a:r>
               <a:rPr lang="en-GB" dirty="0"/>
-              <a:t>So then looking at this, I grouped the failed, </a:t>
-            </a:r>
-            <a:r>
-              <a:rPr lang="en-GB" dirty="0" err="1"/>
-              <a:t>canceled</a:t>
-            </a:r>
-            <a:r>
-              <a:rPr lang="en-GB" dirty="0"/>
-              <a:t>, postponed and undefined into an unsuccessful category </a:t>
+              <a:t>However the pledge real is filled so I decided that if I did anything relating to location then I wouldn’t include them, but for an overall I could keep them</a:t>
             </a:r>
           </a:p>
           <a:p>
@@ -555,67 +555,7 @@
             </a:pPr>
             <a:r>
               <a:rPr lang="en-GB" dirty="0"/>
-              <a:t>But then after looking up a few online, I realised that actually some of the undefined were actually successful</a:t>
-            </a:r>
-          </a:p>
-          <a:p>
-            <a:pPr marL="171450" indent="-171450">
-              <a:buFont typeface="Arial" panose="020B0604020202020204" pitchFamily="34" charset="0"/>
-              <a:buChar char="•"/>
-            </a:pPr>
-            <a:r>
-              <a:rPr lang="en-GB" dirty="0"/>
-              <a:t>However all of them had no country entry so obviously I couldn’t include them in anything that was dependent on that</a:t>
-            </a:r>
-          </a:p>
-          <a:p>
-            <a:pPr marL="171450" indent="-171450">
-              <a:buFont typeface="Arial" panose="020B0604020202020204" pitchFamily="34" charset="0"/>
-              <a:buChar char="•"/>
-            </a:pPr>
-            <a:r>
-              <a:rPr lang="en-GB" dirty="0"/>
-              <a:t>So I simply looked whether the pledged amount was greater than the goal amount and considered this to be a success</a:t>
-            </a:r>
-          </a:p>
-          <a:p>
-            <a:pPr marL="171450" indent="-171450">
-              <a:buFont typeface="Arial" panose="020B0604020202020204" pitchFamily="34" charset="0"/>
-              <a:buChar char="•"/>
-            </a:pPr>
-            <a:r>
-              <a:rPr lang="en-GB" dirty="0"/>
-              <a:t>Obviously they could have been postponed or cancelled, but for a broad picture, I thought they’d be worth including </a:t>
-            </a:r>
-          </a:p>
-          <a:p>
-            <a:pPr marL="171450" indent="-171450">
-              <a:buFont typeface="Arial" panose="020B0604020202020204" pitchFamily="34" charset="0"/>
-              <a:buChar char="•"/>
-            </a:pPr>
-            <a:r>
-              <a:rPr lang="en-GB" dirty="0"/>
-              <a:t>SO HERE WE GO</a:t>
-            </a:r>
-          </a:p>
-          <a:p>
-            <a:pPr marL="171450" indent="-171450">
-              <a:buFont typeface="Arial" panose="020B0604020202020204" pitchFamily="34" charset="0"/>
-              <a:buChar char="•"/>
-            </a:pPr>
-            <a:r>
-              <a:rPr lang="en-GB" dirty="0"/>
-              <a:t>Then I thought, what would be most interesting to look into and I thought, why not the one that has the worst success rate</a:t>
-            </a:r>
-          </a:p>
-          <a:p>
-            <a:pPr marL="171450" indent="-171450">
-              <a:buFont typeface="Arial" panose="020B0604020202020204" pitchFamily="34" charset="0"/>
-              <a:buChar char="•"/>
-            </a:pPr>
-            <a:r>
-              <a:rPr lang="en-GB" dirty="0"/>
-              <a:t>WITH A TREMENDOUS 80% failure rate, lets talk about tech</a:t>
+              <a:t>Ill explain what I did about the status later too</a:t>
             </a:r>
           </a:p>
           <a:p>
@@ -625,6 +565,13 @@
             </a:pPr>
             <a:endParaRPr lang="en-GB" dirty="0"/>
           </a:p>
+          <a:p>
+            <a:pPr marL="171450" indent="-171450">
+              <a:buFont typeface="Arial" panose="020B0604020202020204" pitchFamily="34" charset="0"/>
+              <a:buChar char="•"/>
+            </a:pPr>
+            <a:endParaRPr lang="en-GB" dirty="0"/>
+          </a:p>
         </p:txBody>
       </p:sp>
       <p:sp>
@@ -653,7 +600,7 @@
     </p:spTree>
     <p:extLst>
       <p:ext uri="{BB962C8B-B14F-4D97-AF65-F5344CB8AC3E}">
-        <p14:creationId xmlns:p14="http://schemas.microsoft.com/office/powerpoint/2010/main" val="1063242557"/>
+        <p14:creationId xmlns:p14="http://schemas.microsoft.com/office/powerpoint/2010/main" val="2172963577"/>
       </p:ext>
     </p:extLst>
   </p:cSld>
@@ -713,7 +660,7 @@
             </a:pPr>
             <a:r>
               <a:rPr lang="en-GB" dirty="0"/>
-              <a:t>So lets look at the categories within tech</a:t>
+              <a:t>So initially I did some overall visualisations across the whole dataset to try and help me decide where to focus</a:t>
             </a:r>
           </a:p>
           <a:p>
@@ -723,7 +670,7 @@
             </a:pPr>
             <a:r>
               <a:rPr lang="en-GB" dirty="0"/>
-              <a:t>As we can see, its across the board pretty consistently unsuccessful in all of the subcategories </a:t>
+              <a:t>I decided not to consider the live projects, as we don’t know whether they were successful or not </a:t>
             </a:r>
           </a:p>
           <a:p>
@@ -733,7 +680,15 @@
             </a:pPr>
             <a:r>
               <a:rPr lang="en-GB" dirty="0"/>
-              <a:t>And somehow, it would appear we are more successful in space exploration, than in apps, remarkable</a:t>
+              <a:t>So then looking at this, I grouped the failed, </a:t>
+            </a:r>
+            <a:r>
+              <a:rPr lang="en-GB" dirty="0" err="1"/>
+              <a:t>canceled</a:t>
+            </a:r>
+            <a:r>
+              <a:rPr lang="en-GB" dirty="0"/>
+              <a:t>, postponed and undefined into an unsuccessful category </a:t>
             </a:r>
           </a:p>
           <a:p>
@@ -743,7 +698,67 @@
             </a:pPr>
             <a:r>
               <a:rPr lang="en-GB" dirty="0"/>
-              <a:t>Mention how like its maybe not the categories fault, maybe it’s the type of people who are committing to these projects</a:t>
+              <a:t>But then after looking up a few online, I realised that actually some of the undefined were actually successful</a:t>
+            </a:r>
+          </a:p>
+          <a:p>
+            <a:pPr marL="171450" indent="-171450">
+              <a:buFont typeface="Arial" panose="020B0604020202020204" pitchFamily="34" charset="0"/>
+              <a:buChar char="•"/>
+            </a:pPr>
+            <a:r>
+              <a:rPr lang="en-GB" dirty="0"/>
+              <a:t>However all of them had no country entry so obviously I couldn’t include them in anything that was dependent on that</a:t>
+            </a:r>
+          </a:p>
+          <a:p>
+            <a:pPr marL="171450" indent="-171450">
+              <a:buFont typeface="Arial" panose="020B0604020202020204" pitchFamily="34" charset="0"/>
+              <a:buChar char="•"/>
+            </a:pPr>
+            <a:r>
+              <a:rPr lang="en-GB" dirty="0"/>
+              <a:t>So I simply looked whether the pledged amount was greater than the goal amount and considered this to be a success</a:t>
+            </a:r>
+          </a:p>
+          <a:p>
+            <a:pPr marL="171450" indent="-171450">
+              <a:buFont typeface="Arial" panose="020B0604020202020204" pitchFamily="34" charset="0"/>
+              <a:buChar char="•"/>
+            </a:pPr>
+            <a:r>
+              <a:rPr lang="en-GB" dirty="0"/>
+              <a:t>Obviously they could have been postponed or cancelled, but for a broad picture, I thought they’d be worth including </a:t>
+            </a:r>
+          </a:p>
+          <a:p>
+            <a:pPr marL="171450" indent="-171450">
+              <a:buFont typeface="Arial" panose="020B0604020202020204" pitchFamily="34" charset="0"/>
+              <a:buChar char="•"/>
+            </a:pPr>
+            <a:r>
+              <a:rPr lang="en-GB" dirty="0"/>
+              <a:t>SO HERE WE GO</a:t>
+            </a:r>
+          </a:p>
+          <a:p>
+            <a:pPr marL="171450" indent="-171450">
+              <a:buFont typeface="Arial" panose="020B0604020202020204" pitchFamily="34" charset="0"/>
+              <a:buChar char="•"/>
+            </a:pPr>
+            <a:r>
+              <a:rPr lang="en-GB" dirty="0"/>
+              <a:t>Then I thought, what would be most interesting to look into and I thought, why not the one that has the worst success rate</a:t>
+            </a:r>
+          </a:p>
+          <a:p>
+            <a:pPr marL="171450" indent="-171450">
+              <a:buFont typeface="Arial" panose="020B0604020202020204" pitchFamily="34" charset="0"/>
+              <a:buChar char="•"/>
+            </a:pPr>
+            <a:r>
+              <a:rPr lang="en-GB" dirty="0"/>
+              <a:t>WITH A TREMENDOUS 80% failure rate, lets talk about tech</a:t>
             </a:r>
           </a:p>
           <a:p>
@@ -781,7 +796,7 @@
     </p:spTree>
     <p:extLst>
       <p:ext uri="{BB962C8B-B14F-4D97-AF65-F5344CB8AC3E}">
-        <p14:creationId xmlns:p14="http://schemas.microsoft.com/office/powerpoint/2010/main" val="660280902"/>
+        <p14:creationId xmlns:p14="http://schemas.microsoft.com/office/powerpoint/2010/main" val="1063242557"/>
       </p:ext>
     </p:extLst>
   </p:cSld>
@@ -841,15 +856,37 @@
             </a:pPr>
             <a:r>
               <a:rPr lang="en-GB" dirty="0"/>
-              <a:t>So at first I thought about checking to see if any of the dates were incorrect that would affect my data, these 7 records have a strange error, however they were all failures, so I thought id keep them in for any general counts etc, but if I did anything that was requiring a timescale, </a:t>
-            </a:r>
-            <a:r>
-              <a:rPr lang="en-GB" dirty="0" err="1"/>
-              <a:t>i’d</a:t>
-            </a:r>
+              <a:t>So lets look at the categories within tech</a:t>
+            </a:r>
+          </a:p>
+          <a:p>
+            <a:pPr marL="171450" indent="-171450">
+              <a:buFont typeface="Arial" panose="020B0604020202020204" pitchFamily="34" charset="0"/>
+              <a:buChar char="•"/>
+            </a:pPr>
             <a:r>
               <a:rPr lang="en-GB" dirty="0"/>
-              <a:t> remove them </a:t>
+              <a:t>As we can see, its across the board pretty consistently unsuccessful in all of the subcategories </a:t>
+            </a:r>
+          </a:p>
+          <a:p>
+            <a:pPr marL="171450" indent="-171450">
+              <a:buFont typeface="Arial" panose="020B0604020202020204" pitchFamily="34" charset="0"/>
+              <a:buChar char="•"/>
+            </a:pPr>
+            <a:r>
+              <a:rPr lang="en-GB" dirty="0"/>
+              <a:t>And somehow, it would appear we are more successful in space exploration, than in apps, remarkable</a:t>
+            </a:r>
+          </a:p>
+          <a:p>
+            <a:pPr marL="171450" indent="-171450">
+              <a:buFont typeface="Arial" panose="020B0604020202020204" pitchFamily="34" charset="0"/>
+              <a:buChar char="•"/>
+            </a:pPr>
+            <a:r>
+              <a:rPr lang="en-GB" dirty="0"/>
+              <a:t>Mention how like its maybe not the categories fault, maybe it’s the type of people who are committing to these projects</a:t>
             </a:r>
           </a:p>
           <a:p>
@@ -887,7 +924,7 @@
     </p:spTree>
     <p:extLst>
       <p:ext uri="{BB962C8B-B14F-4D97-AF65-F5344CB8AC3E}">
-        <p14:creationId xmlns:p14="http://schemas.microsoft.com/office/powerpoint/2010/main" val="2172963577"/>
+        <p14:creationId xmlns:p14="http://schemas.microsoft.com/office/powerpoint/2010/main" val="660280902"/>
       </p:ext>
     </p:extLst>
   </p:cSld>
@@ -4134,10 +4171,10 @@
       </p:grpSpPr>
       <p:sp>
         <p:nvSpPr>
-          <p:cNvPr id="4" name="Title 3">
-            <a:extLst>
-              <a:ext uri="{FF2B5EF4-FFF2-40B4-BE49-F238E27FC236}">
-                <a16:creationId xmlns:a16="http://schemas.microsoft.com/office/drawing/2014/main" id="{19AFC190-DFBA-42FF-B8A5-A8C08E065E87}"/>
+          <p:cNvPr id="5" name="Title 4">
+            <a:extLst>
+              <a:ext uri="{FF2B5EF4-FFF2-40B4-BE49-F238E27FC236}">
+                <a16:creationId xmlns:a16="http://schemas.microsoft.com/office/drawing/2014/main" id="{E54C28A8-E9B6-4559-A730-D09788342A70}"/>
               </a:ext>
             </a:extLst>
           </p:cNvPr>
@@ -4155,7 +4192,7 @@
           <a:p>
             <a:r>
               <a:rPr lang="en-GB" dirty="0"/>
-              <a:t>Page 1</a:t>
+              <a:t>Data cleaning</a:t>
             </a:r>
           </a:p>
         </p:txBody>
@@ -4163,7 +4200,7 @@
     </p:spTree>
     <p:extLst>
       <p:ext uri="{BB962C8B-B14F-4D97-AF65-F5344CB8AC3E}">
-        <p14:creationId xmlns:p14="http://schemas.microsoft.com/office/powerpoint/2010/main" val="2498786466"/>
+        <p14:creationId xmlns:p14="http://schemas.microsoft.com/office/powerpoint/2010/main" val="1681920206"/>
       </p:ext>
     </p:extLst>
   </p:cSld>
@@ -4192,18 +4229,18 @@
       </p:grpSpPr>
       <p:sp>
         <p:nvSpPr>
-          <p:cNvPr id="3" name="Subtitle 2">
-            <a:extLst>
-              <a:ext uri="{FF2B5EF4-FFF2-40B4-BE49-F238E27FC236}">
-                <a16:creationId xmlns:a16="http://schemas.microsoft.com/office/drawing/2014/main" id="{51C14C64-2490-4863-9620-36DD53A135F8}"/>
-              </a:ext>
-            </a:extLst>
-          </p:cNvPr>
-          <p:cNvSpPr>
-            <a:spLocks noGrp="1"/>
-          </p:cNvSpPr>
-          <p:nvPr>
-            <p:ph type="subTitle" idx="1"/>
+          <p:cNvPr id="4" name="Title 3">
+            <a:extLst>
+              <a:ext uri="{FF2B5EF4-FFF2-40B4-BE49-F238E27FC236}">
+                <a16:creationId xmlns:a16="http://schemas.microsoft.com/office/drawing/2014/main" id="{19AFC190-DFBA-42FF-B8A5-A8C08E065E87}"/>
+              </a:ext>
+            </a:extLst>
+          </p:cNvPr>
+          <p:cNvSpPr>
+            <a:spLocks noGrp="1"/>
+          </p:cNvSpPr>
+          <p:nvPr>
+            <p:ph type="title"/>
           </p:nvPr>
         </p:nvSpPr>
         <p:spPr/>
@@ -4213,7 +4250,7 @@
           <a:p>
             <a:r>
               <a:rPr lang="en-GB" dirty="0"/>
-              <a:t>Tech zoom in</a:t>
+              <a:t>Page 1</a:t>
             </a:r>
           </a:p>
         </p:txBody>
@@ -4221,7 +4258,7 @@
     </p:spTree>
     <p:extLst>
       <p:ext uri="{BB962C8B-B14F-4D97-AF65-F5344CB8AC3E}">
-        <p14:creationId xmlns:p14="http://schemas.microsoft.com/office/powerpoint/2010/main" val="1610470447"/>
+        <p14:creationId xmlns:p14="http://schemas.microsoft.com/office/powerpoint/2010/main" val="2498786466"/>
       </p:ext>
     </p:extLst>
   </p:cSld>
@@ -4250,18 +4287,18 @@
       </p:grpSpPr>
       <p:sp>
         <p:nvSpPr>
-          <p:cNvPr id="5" name="Title 4">
-            <a:extLst>
-              <a:ext uri="{FF2B5EF4-FFF2-40B4-BE49-F238E27FC236}">
-                <a16:creationId xmlns:a16="http://schemas.microsoft.com/office/drawing/2014/main" id="{E54C28A8-E9B6-4559-A730-D09788342A70}"/>
-              </a:ext>
-            </a:extLst>
-          </p:cNvPr>
-          <p:cNvSpPr>
-            <a:spLocks noGrp="1"/>
-          </p:cNvSpPr>
-          <p:nvPr>
-            <p:ph type="title"/>
+          <p:cNvPr id="3" name="Subtitle 2">
+            <a:extLst>
+              <a:ext uri="{FF2B5EF4-FFF2-40B4-BE49-F238E27FC236}">
+                <a16:creationId xmlns:a16="http://schemas.microsoft.com/office/drawing/2014/main" id="{51C14C64-2490-4863-9620-36DD53A135F8}"/>
+              </a:ext>
+            </a:extLst>
+          </p:cNvPr>
+          <p:cNvSpPr>
+            <a:spLocks noGrp="1"/>
+          </p:cNvSpPr>
+          <p:nvPr>
+            <p:ph type="subTitle" idx="1"/>
           </p:nvPr>
         </p:nvSpPr>
         <p:spPr/>
@@ -4271,7 +4308,7 @@
           <a:p>
             <a:r>
               <a:rPr lang="en-GB" dirty="0"/>
-              <a:t>Data cleaning</a:t>
+              <a:t>Tech zoom in</a:t>
             </a:r>
           </a:p>
         </p:txBody>
@@ -4279,7 +4316,7 @@
     </p:spTree>
     <p:extLst>
       <p:ext uri="{BB962C8B-B14F-4D97-AF65-F5344CB8AC3E}">
-        <p14:creationId xmlns:p14="http://schemas.microsoft.com/office/powerpoint/2010/main" val="1681920206"/>
+        <p14:creationId xmlns:p14="http://schemas.microsoft.com/office/powerpoint/2010/main" val="1610470447"/>
       </p:ext>
     </p:extLst>
   </p:cSld>

</xml_diff>

<commit_message>
did success vs failure plots
</commit_message>
<xml_diff>
--- a/Page 1.pptx
+++ b/Page 1.pptx
@@ -5,12 +5,15 @@
     <p:sldMasterId id="2147483648" r:id="rId1"/>
   </p:sldMasterIdLst>
   <p:notesMasterIdLst>
-    <p:notesMasterId r:id="rId5"/>
+    <p:notesMasterId r:id="rId8"/>
   </p:notesMasterIdLst>
   <p:sldIdLst>
     <p:sldId id="256" r:id="rId2"/>
     <p:sldId id="258" r:id="rId3"/>
     <p:sldId id="257" r:id="rId4"/>
+    <p:sldId id="259" r:id="rId5"/>
+    <p:sldId id="260" r:id="rId6"/>
+    <p:sldId id="261" r:id="rId7"/>
   </p:sldIdLst>
   <p:sldSz cx="12192000" cy="6858000"/>
   <p:notesSz cx="6858000" cy="9144000"/>
@@ -925,6 +928,323 @@
     <p:extLst>
       <p:ext uri="{BB962C8B-B14F-4D97-AF65-F5344CB8AC3E}">
         <p14:creationId xmlns:p14="http://schemas.microsoft.com/office/powerpoint/2010/main" val="660280902"/>
+      </p:ext>
+    </p:extLst>
+  </p:cSld>
+  <p:clrMapOvr>
+    <a:masterClrMapping/>
+  </p:clrMapOvr>
+</p:notes>
+</file>
+
+<file path=ppt/notesSlides/notesSlide4.xml><?xml version="1.0" encoding="utf-8"?>
+<p:notes xmlns:a="http://schemas.openxmlformats.org/drawingml/2006/main" xmlns:r="http://schemas.openxmlformats.org/officeDocument/2006/relationships" xmlns:p="http://schemas.openxmlformats.org/presentationml/2006/main">
+  <p:cSld>
+    <p:spTree>
+      <p:nvGrpSpPr>
+        <p:cNvPr id="1" name=""/>
+        <p:cNvGrpSpPr/>
+        <p:nvPr/>
+      </p:nvGrpSpPr>
+      <p:grpSpPr>
+        <a:xfrm>
+          <a:off x="0" y="0"/>
+          <a:ext cx="0" cy="0"/>
+          <a:chOff x="0" y="0"/>
+          <a:chExt cx="0" cy="0"/>
+        </a:xfrm>
+      </p:grpSpPr>
+      <p:sp>
+        <p:nvSpPr>
+          <p:cNvPr id="2" name="Slide Image Placeholder 1"/>
+          <p:cNvSpPr>
+            <a:spLocks noGrp="1" noRot="1" noChangeAspect="1"/>
+          </p:cNvSpPr>
+          <p:nvPr>
+            <p:ph type="sldImg"/>
+          </p:nvPr>
+        </p:nvSpPr>
+        <p:spPr/>
+      </p:sp>
+      <p:sp>
+        <p:nvSpPr>
+          <p:cNvPr id="3" name="Notes Placeholder 2"/>
+          <p:cNvSpPr>
+            <a:spLocks noGrp="1"/>
+          </p:cNvSpPr>
+          <p:nvPr>
+            <p:ph type="body" idx="1"/>
+          </p:nvPr>
+        </p:nvSpPr>
+        <p:spPr/>
+        <p:txBody>
+          <a:bodyPr/>
+          <a:lstStyle/>
+          <a:p>
+            <a:pPr marL="171450" indent="-171450">
+              <a:buFont typeface="Arial" panose="020B0604020202020204" pitchFamily="34" charset="0"/>
+              <a:buChar char="•"/>
+            </a:pPr>
+            <a:r>
+              <a:rPr lang="en-GB" dirty="0"/>
+              <a:t>So first I thought od look at the backers vs duration for the whole category</a:t>
+            </a:r>
+          </a:p>
+          <a:p>
+            <a:pPr marL="171450" indent="-171450">
+              <a:buFont typeface="Arial" panose="020B0604020202020204" pitchFamily="34" charset="0"/>
+              <a:buChar char="•"/>
+            </a:pPr>
+            <a:r>
+              <a:rPr lang="en-GB" dirty="0"/>
+              <a:t>However because of the combination of success and failure its hard to see any correlation</a:t>
+            </a:r>
+          </a:p>
+        </p:txBody>
+      </p:sp>
+      <p:sp>
+        <p:nvSpPr>
+          <p:cNvPr id="4" name="Slide Number Placeholder 3"/>
+          <p:cNvSpPr>
+            <a:spLocks noGrp="1"/>
+          </p:cNvSpPr>
+          <p:nvPr>
+            <p:ph type="sldNum" sz="quarter" idx="5"/>
+          </p:nvPr>
+        </p:nvSpPr>
+        <p:spPr/>
+        <p:txBody>
+          <a:bodyPr/>
+          <a:lstStyle/>
+          <a:p>
+            <a:fld id="{C2790DFA-B98D-46A3-A997-8D3A39E1F485}" type="slidenum">
+              <a:rPr lang="en-GB" smtClean="0"/>
+              <a:t>4</a:t>
+            </a:fld>
+            <a:endParaRPr lang="en-GB"/>
+          </a:p>
+        </p:txBody>
+      </p:sp>
+    </p:spTree>
+    <p:extLst>
+      <p:ext uri="{BB962C8B-B14F-4D97-AF65-F5344CB8AC3E}">
+        <p14:creationId xmlns:p14="http://schemas.microsoft.com/office/powerpoint/2010/main" val="2903123439"/>
+      </p:ext>
+    </p:extLst>
+  </p:cSld>
+  <p:clrMapOvr>
+    <a:masterClrMapping/>
+  </p:clrMapOvr>
+</p:notes>
+</file>
+
+<file path=ppt/notesSlides/notesSlide5.xml><?xml version="1.0" encoding="utf-8"?>
+<p:notes xmlns:a="http://schemas.openxmlformats.org/drawingml/2006/main" xmlns:r="http://schemas.openxmlformats.org/officeDocument/2006/relationships" xmlns:p="http://schemas.openxmlformats.org/presentationml/2006/main">
+  <p:cSld>
+    <p:spTree>
+      <p:nvGrpSpPr>
+        <p:cNvPr id="1" name=""/>
+        <p:cNvGrpSpPr/>
+        <p:nvPr/>
+      </p:nvGrpSpPr>
+      <p:grpSpPr>
+        <a:xfrm>
+          <a:off x="0" y="0"/>
+          <a:ext cx="0" cy="0"/>
+          <a:chOff x="0" y="0"/>
+          <a:chExt cx="0" cy="0"/>
+        </a:xfrm>
+      </p:grpSpPr>
+      <p:sp>
+        <p:nvSpPr>
+          <p:cNvPr id="2" name="Slide Image Placeholder 1"/>
+          <p:cNvSpPr>
+            <a:spLocks noGrp="1" noRot="1" noChangeAspect="1"/>
+          </p:cNvSpPr>
+          <p:nvPr>
+            <p:ph type="sldImg"/>
+          </p:nvPr>
+        </p:nvSpPr>
+        <p:spPr/>
+      </p:sp>
+      <p:sp>
+        <p:nvSpPr>
+          <p:cNvPr id="3" name="Notes Placeholder 2"/>
+          <p:cNvSpPr>
+            <a:spLocks noGrp="1"/>
+          </p:cNvSpPr>
+          <p:nvPr>
+            <p:ph type="body" idx="1"/>
+          </p:nvPr>
+        </p:nvSpPr>
+        <p:spPr/>
+        <p:txBody>
+          <a:bodyPr/>
+          <a:lstStyle/>
+          <a:p>
+            <a:pPr marL="171450" indent="-171450">
+              <a:buFont typeface="Arial" panose="020B0604020202020204" pitchFamily="34" charset="0"/>
+              <a:buChar char="•"/>
+            </a:pPr>
+            <a:r>
+              <a:rPr lang="en-GB" dirty="0"/>
+              <a:t>So I did this first to include the failed, suspended and </a:t>
+            </a:r>
+            <a:r>
+              <a:rPr lang="en-GB" dirty="0" err="1"/>
+              <a:t>canceled</a:t>
+            </a:r>
+            <a:r>
+              <a:rPr lang="en-GB" dirty="0"/>
+              <a:t>, and then I noticed that actually some </a:t>
+            </a:r>
+            <a:r>
+              <a:rPr lang="en-GB" dirty="0" err="1"/>
+              <a:t>fo</a:t>
+            </a:r>
+            <a:r>
+              <a:rPr lang="en-GB" dirty="0"/>
+              <a:t> them had reached their target so this threw of the figure</a:t>
+            </a:r>
+          </a:p>
+          <a:p>
+            <a:pPr marL="171450" indent="-171450">
+              <a:buFont typeface="Arial" panose="020B0604020202020204" pitchFamily="34" charset="0"/>
+              <a:buChar char="•"/>
+            </a:pPr>
+            <a:r>
+              <a:rPr lang="en-GB" dirty="0"/>
+              <a:t>So I did just the ones defined as failed</a:t>
+            </a:r>
+          </a:p>
+        </p:txBody>
+      </p:sp>
+      <p:sp>
+        <p:nvSpPr>
+          <p:cNvPr id="4" name="Slide Number Placeholder 3"/>
+          <p:cNvSpPr>
+            <a:spLocks noGrp="1"/>
+          </p:cNvSpPr>
+          <p:nvPr>
+            <p:ph type="sldNum" sz="quarter" idx="5"/>
+          </p:nvPr>
+        </p:nvSpPr>
+        <p:spPr/>
+        <p:txBody>
+          <a:bodyPr/>
+          <a:lstStyle/>
+          <a:p>
+            <a:fld id="{C2790DFA-B98D-46A3-A997-8D3A39E1F485}" type="slidenum">
+              <a:rPr lang="en-GB" smtClean="0"/>
+              <a:t>5</a:t>
+            </a:fld>
+            <a:endParaRPr lang="en-GB"/>
+          </a:p>
+        </p:txBody>
+      </p:sp>
+    </p:spTree>
+    <p:extLst>
+      <p:ext uri="{BB962C8B-B14F-4D97-AF65-F5344CB8AC3E}">
+        <p14:creationId xmlns:p14="http://schemas.microsoft.com/office/powerpoint/2010/main" val="3532624288"/>
+      </p:ext>
+    </p:extLst>
+  </p:cSld>
+  <p:clrMapOvr>
+    <a:masterClrMapping/>
+  </p:clrMapOvr>
+</p:notes>
+</file>
+
+<file path=ppt/notesSlides/notesSlide6.xml><?xml version="1.0" encoding="utf-8"?>
+<p:notes xmlns:a="http://schemas.openxmlformats.org/drawingml/2006/main" xmlns:r="http://schemas.openxmlformats.org/officeDocument/2006/relationships" xmlns:p="http://schemas.openxmlformats.org/presentationml/2006/main">
+  <p:cSld>
+    <p:spTree>
+      <p:nvGrpSpPr>
+        <p:cNvPr id="1" name=""/>
+        <p:cNvGrpSpPr/>
+        <p:nvPr/>
+      </p:nvGrpSpPr>
+      <p:grpSpPr>
+        <a:xfrm>
+          <a:off x="0" y="0"/>
+          <a:ext cx="0" cy="0"/>
+          <a:chOff x="0" y="0"/>
+          <a:chExt cx="0" cy="0"/>
+        </a:xfrm>
+      </p:grpSpPr>
+      <p:sp>
+        <p:nvSpPr>
+          <p:cNvPr id="2" name="Slide Image Placeholder 1"/>
+          <p:cNvSpPr>
+            <a:spLocks noGrp="1" noRot="1" noChangeAspect="1"/>
+          </p:cNvSpPr>
+          <p:nvPr>
+            <p:ph type="sldImg"/>
+          </p:nvPr>
+        </p:nvSpPr>
+        <p:spPr/>
+      </p:sp>
+      <p:sp>
+        <p:nvSpPr>
+          <p:cNvPr id="3" name="Notes Placeholder 2"/>
+          <p:cNvSpPr>
+            <a:spLocks noGrp="1"/>
+          </p:cNvSpPr>
+          <p:nvPr>
+            <p:ph type="body" idx="1"/>
+          </p:nvPr>
+        </p:nvSpPr>
+        <p:spPr/>
+        <p:txBody>
+          <a:bodyPr/>
+          <a:lstStyle/>
+          <a:p>
+            <a:pPr marL="171450" indent="-171450">
+              <a:buFont typeface="Arial" panose="020B0604020202020204" pitchFamily="34" charset="0"/>
+              <a:buChar char="•"/>
+            </a:pPr>
+            <a:r>
+              <a:rPr lang="en-GB" dirty="0"/>
+              <a:t>And so again it looks pretty similar, in fact if we look at them side by side……. However the </a:t>
+            </a:r>
+            <a:r>
+              <a:rPr lang="en-GB"/>
+              <a:t>scales vary </a:t>
+            </a:r>
+            <a:r>
+              <a:rPr lang="en-GB" dirty="0"/>
+              <a:t>slightly </a:t>
+            </a:r>
+          </a:p>
+        </p:txBody>
+      </p:sp>
+      <p:sp>
+        <p:nvSpPr>
+          <p:cNvPr id="4" name="Slide Number Placeholder 3"/>
+          <p:cNvSpPr>
+            <a:spLocks noGrp="1"/>
+          </p:cNvSpPr>
+          <p:nvPr>
+            <p:ph type="sldNum" sz="quarter" idx="5"/>
+          </p:nvPr>
+        </p:nvSpPr>
+        <p:spPr/>
+        <p:txBody>
+          <a:bodyPr/>
+          <a:lstStyle/>
+          <a:p>
+            <a:fld id="{C2790DFA-B98D-46A3-A997-8D3A39E1F485}" type="slidenum">
+              <a:rPr lang="en-GB" smtClean="0"/>
+              <a:t>6</a:t>
+            </a:fld>
+            <a:endParaRPr lang="en-GB"/>
+          </a:p>
+        </p:txBody>
+      </p:sp>
+    </p:spTree>
+    <p:extLst>
+      <p:ext uri="{BB962C8B-B14F-4D97-AF65-F5344CB8AC3E}">
+        <p14:creationId xmlns:p14="http://schemas.microsoft.com/office/powerpoint/2010/main" val="17302270"/>
       </p:ext>
     </p:extLst>
   </p:cSld>
@@ -4317,6 +4637,201 @@
     <p:extLst>
       <p:ext uri="{BB962C8B-B14F-4D97-AF65-F5344CB8AC3E}">
         <p14:creationId xmlns:p14="http://schemas.microsoft.com/office/powerpoint/2010/main" val="1610470447"/>
+      </p:ext>
+    </p:extLst>
+  </p:cSld>
+  <p:clrMapOvr>
+    <a:masterClrMapping/>
+  </p:clrMapOvr>
+</p:sld>
+</file>
+
+<file path=ppt/slides/slide4.xml><?xml version="1.0" encoding="utf-8"?>
+<p:sld xmlns:a="http://schemas.openxmlformats.org/drawingml/2006/main" xmlns:r="http://schemas.openxmlformats.org/officeDocument/2006/relationships" xmlns:p="http://schemas.openxmlformats.org/presentationml/2006/main">
+  <p:cSld>
+    <p:spTree>
+      <p:nvGrpSpPr>
+        <p:cNvPr id="1" name=""/>
+        <p:cNvGrpSpPr/>
+        <p:nvPr/>
+      </p:nvGrpSpPr>
+      <p:grpSpPr>
+        <a:xfrm>
+          <a:off x="0" y="0"/>
+          <a:ext cx="0" cy="0"/>
+          <a:chOff x="0" y="0"/>
+          <a:chExt cx="0" cy="0"/>
+        </a:xfrm>
+      </p:grpSpPr>
+      <p:sp>
+        <p:nvSpPr>
+          <p:cNvPr id="4" name="Title 3">
+            <a:extLst>
+              <a:ext uri="{FF2B5EF4-FFF2-40B4-BE49-F238E27FC236}">
+                <a16:creationId xmlns:a16="http://schemas.microsoft.com/office/drawing/2014/main" id="{2AF56D7C-EE1A-4257-BF91-6FA0C7D13484}"/>
+              </a:ext>
+            </a:extLst>
+          </p:cNvPr>
+          <p:cNvSpPr>
+            <a:spLocks noGrp="1"/>
+          </p:cNvSpPr>
+          <p:nvPr>
+            <p:ph type="title"/>
+          </p:nvPr>
+        </p:nvSpPr>
+        <p:spPr/>
+        <p:txBody>
+          <a:bodyPr/>
+          <a:lstStyle/>
+          <a:p>
+            <a:r>
+              <a:rPr lang="en-GB" dirty="0" err="1"/>
+              <a:t>Kde</a:t>
+            </a:r>
+            <a:r>
+              <a:rPr lang="en-GB" dirty="0"/>
+              <a:t> for overall </a:t>
+            </a:r>
+            <a:r>
+              <a:rPr lang="en-GB" dirty="0" err="1"/>
+              <a:t>tec</a:t>
+            </a:r>
+            <a:endParaRPr lang="en-GB" dirty="0"/>
+          </a:p>
+        </p:txBody>
+      </p:sp>
+    </p:spTree>
+    <p:extLst>
+      <p:ext uri="{BB962C8B-B14F-4D97-AF65-F5344CB8AC3E}">
+        <p14:creationId xmlns:p14="http://schemas.microsoft.com/office/powerpoint/2010/main" val="254036775"/>
+      </p:ext>
+    </p:extLst>
+  </p:cSld>
+  <p:clrMapOvr>
+    <a:masterClrMapping/>
+  </p:clrMapOvr>
+</p:sld>
+</file>
+
+<file path=ppt/slides/slide5.xml><?xml version="1.0" encoding="utf-8"?>
+<p:sld xmlns:a="http://schemas.openxmlformats.org/drawingml/2006/main" xmlns:r="http://schemas.openxmlformats.org/officeDocument/2006/relationships" xmlns:p="http://schemas.openxmlformats.org/presentationml/2006/main">
+  <p:cSld>
+    <p:spTree>
+      <p:nvGrpSpPr>
+        <p:cNvPr id="1" name=""/>
+        <p:cNvGrpSpPr/>
+        <p:nvPr/>
+      </p:nvGrpSpPr>
+      <p:grpSpPr>
+        <a:xfrm>
+          <a:off x="0" y="0"/>
+          <a:ext cx="0" cy="0"/>
+          <a:chOff x="0" y="0"/>
+          <a:chExt cx="0" cy="0"/>
+        </a:xfrm>
+      </p:grpSpPr>
+      <p:sp>
+        <p:nvSpPr>
+          <p:cNvPr id="2" name="Title 1">
+            <a:extLst>
+              <a:ext uri="{FF2B5EF4-FFF2-40B4-BE49-F238E27FC236}">
+                <a16:creationId xmlns:a16="http://schemas.microsoft.com/office/drawing/2014/main" id="{763F37E9-1FBB-478D-B469-543EA94CED4D}"/>
+              </a:ext>
+            </a:extLst>
+          </p:cNvPr>
+          <p:cNvSpPr>
+            <a:spLocks noGrp="1"/>
+          </p:cNvSpPr>
+          <p:nvPr>
+            <p:ph type="title"/>
+          </p:nvPr>
+        </p:nvSpPr>
+        <p:spPr/>
+        <p:txBody>
+          <a:bodyPr/>
+          <a:lstStyle/>
+          <a:p>
+            <a:r>
+              <a:rPr lang="en-GB" dirty="0" err="1"/>
+              <a:t>Kde</a:t>
+            </a:r>
+            <a:r>
+              <a:rPr lang="en-GB" dirty="0"/>
+              <a:t> </a:t>
+            </a:r>
+            <a:r>
+              <a:rPr lang="en-GB" dirty="0" err="1"/>
+              <a:t>jointplot</a:t>
+            </a:r>
+            <a:r>
+              <a:rPr lang="en-GB" dirty="0"/>
+              <a:t> for failures</a:t>
+            </a:r>
+          </a:p>
+        </p:txBody>
+      </p:sp>
+    </p:spTree>
+    <p:extLst>
+      <p:ext uri="{BB962C8B-B14F-4D97-AF65-F5344CB8AC3E}">
+        <p14:creationId xmlns:p14="http://schemas.microsoft.com/office/powerpoint/2010/main" val="3362863595"/>
+      </p:ext>
+    </p:extLst>
+  </p:cSld>
+  <p:clrMapOvr>
+    <a:masterClrMapping/>
+  </p:clrMapOvr>
+</p:sld>
+</file>
+
+<file path=ppt/slides/slide6.xml><?xml version="1.0" encoding="utf-8"?>
+<p:sld xmlns:a="http://schemas.openxmlformats.org/drawingml/2006/main" xmlns:r="http://schemas.openxmlformats.org/officeDocument/2006/relationships" xmlns:p="http://schemas.openxmlformats.org/presentationml/2006/main">
+  <p:cSld>
+    <p:spTree>
+      <p:nvGrpSpPr>
+        <p:cNvPr id="1" name=""/>
+        <p:cNvGrpSpPr/>
+        <p:nvPr/>
+      </p:nvGrpSpPr>
+      <p:grpSpPr>
+        <a:xfrm>
+          <a:off x="0" y="0"/>
+          <a:ext cx="0" cy="0"/>
+          <a:chOff x="0" y="0"/>
+          <a:chExt cx="0" cy="0"/>
+        </a:xfrm>
+      </p:grpSpPr>
+      <p:sp>
+        <p:nvSpPr>
+          <p:cNvPr id="3" name="Title 2">
+            <a:extLst>
+              <a:ext uri="{FF2B5EF4-FFF2-40B4-BE49-F238E27FC236}">
+                <a16:creationId xmlns:a16="http://schemas.microsoft.com/office/drawing/2014/main" id="{31C3C6F9-B586-4C3B-AA64-4EA6A164B739}"/>
+              </a:ext>
+            </a:extLst>
+          </p:cNvPr>
+          <p:cNvSpPr>
+            <a:spLocks noGrp="1"/>
+          </p:cNvSpPr>
+          <p:nvPr>
+            <p:ph type="title"/>
+          </p:nvPr>
+        </p:nvSpPr>
+        <p:spPr/>
+        <p:txBody>
+          <a:bodyPr/>
+          <a:lstStyle/>
+          <a:p>
+            <a:r>
+              <a:rPr lang="en-GB" dirty="0"/>
+              <a:t>Joint plot for successes</a:t>
+            </a:r>
+          </a:p>
+        </p:txBody>
+      </p:sp>
+    </p:spTree>
+    <p:extLst>
+      <p:ext uri="{BB962C8B-B14F-4D97-AF65-F5344CB8AC3E}">
+        <p14:creationId xmlns:p14="http://schemas.microsoft.com/office/powerpoint/2010/main" val="3375515068"/>
       </p:ext>
     </p:extLst>
   </p:cSld>

</xml_diff>

<commit_message>
failures goal amounts analysis
</commit_message>
<xml_diff>
--- a/Page 1.pptx
+++ b/Page 1.pptx
@@ -5,7 +5,7 @@
     <p:sldMasterId id="2147483648" r:id="rId1"/>
   </p:sldMasterIdLst>
   <p:notesMasterIdLst>
-    <p:notesMasterId r:id="rId9"/>
+    <p:notesMasterId r:id="rId13"/>
   </p:notesMasterIdLst>
   <p:sldIdLst>
     <p:sldId id="256" r:id="rId2"/>
@@ -15,6 +15,10 @@
     <p:sldId id="260" r:id="rId6"/>
     <p:sldId id="261" r:id="rId7"/>
     <p:sldId id="262" r:id="rId8"/>
+    <p:sldId id="263" r:id="rId9"/>
+    <p:sldId id="264" r:id="rId10"/>
+    <p:sldId id="265" r:id="rId11"/>
+    <p:sldId id="266" r:id="rId12"/>
   </p:sldIdLst>
   <p:sldSz cx="12192000" cy="6858000"/>
   <p:notesSz cx="6858000" cy="9144000"/>
@@ -614,6 +618,229 @@
 </p:notes>
 </file>
 
+<file path=ppt/notesSlides/notesSlide10.xml><?xml version="1.0" encoding="utf-8"?>
+<p:notes xmlns:a="http://schemas.openxmlformats.org/drawingml/2006/main" xmlns:r="http://schemas.openxmlformats.org/officeDocument/2006/relationships" xmlns:p="http://schemas.openxmlformats.org/presentationml/2006/main">
+  <p:cSld>
+    <p:spTree>
+      <p:nvGrpSpPr>
+        <p:cNvPr id="1" name=""/>
+        <p:cNvGrpSpPr/>
+        <p:nvPr/>
+      </p:nvGrpSpPr>
+      <p:grpSpPr>
+        <a:xfrm>
+          <a:off x="0" y="0"/>
+          <a:ext cx="0" cy="0"/>
+          <a:chOff x="0" y="0"/>
+          <a:chExt cx="0" cy="0"/>
+        </a:xfrm>
+      </p:grpSpPr>
+      <p:sp>
+        <p:nvSpPr>
+          <p:cNvPr id="2" name="Slide Image Placeholder 1"/>
+          <p:cNvSpPr>
+            <a:spLocks noGrp="1" noRot="1" noChangeAspect="1"/>
+          </p:cNvSpPr>
+          <p:nvPr>
+            <p:ph type="sldImg"/>
+          </p:nvPr>
+        </p:nvSpPr>
+        <p:spPr/>
+      </p:sp>
+      <p:sp>
+        <p:nvSpPr>
+          <p:cNvPr id="3" name="Notes Placeholder 2"/>
+          <p:cNvSpPr>
+            <a:spLocks noGrp="1"/>
+          </p:cNvSpPr>
+          <p:nvPr>
+            <p:ph type="body" idx="1"/>
+          </p:nvPr>
+        </p:nvSpPr>
+        <p:spPr/>
+        <p:txBody>
+          <a:bodyPr/>
+          <a:lstStyle/>
+          <a:p>
+            <a:pPr marL="171450" indent="-171450">
+              <a:buFont typeface="Arial" panose="020B0604020202020204" pitchFamily="34" charset="0"/>
+              <a:buChar char="•"/>
+            </a:pPr>
+            <a:r>
+              <a:rPr lang="en-GB" dirty="0"/>
+              <a:t>So I looked at the describe for my new set of data, which had my two outliers removed</a:t>
+            </a:r>
+          </a:p>
+          <a:p>
+            <a:pPr marL="171450" indent="-171450">
+              <a:buFont typeface="Arial" panose="020B0604020202020204" pitchFamily="34" charset="0"/>
+              <a:buChar char="•"/>
+            </a:pPr>
+            <a:r>
+              <a:rPr lang="en-GB" dirty="0"/>
+              <a:t>The campaigns with more than 100 backers</a:t>
+            </a:r>
+          </a:p>
+          <a:p>
+            <a:pPr marL="171450" indent="-171450">
+              <a:buFont typeface="Arial" panose="020B0604020202020204" pitchFamily="34" charset="0"/>
+              <a:buChar char="•"/>
+            </a:pPr>
+            <a:r>
+              <a:rPr lang="en-GB" dirty="0"/>
+              <a:t>And </a:t>
+            </a:r>
+            <a:r>
+              <a:rPr lang="en-GB" dirty="0" err="1"/>
+              <a:t>im</a:t>
+            </a:r>
+            <a:r>
+              <a:rPr lang="en-GB" dirty="0"/>
+              <a:t> interested in the standard deviations here</a:t>
+            </a:r>
+          </a:p>
+          <a:p>
+            <a:pPr marL="171450" indent="-171450">
+              <a:buFont typeface="Arial" panose="020B0604020202020204" pitchFamily="34" charset="0"/>
+              <a:buChar char="•"/>
+            </a:pPr>
+            <a:r>
+              <a:rPr lang="en-GB" dirty="0"/>
+              <a:t>So I decided to remove the top 25% and see how this would affect my visualisations</a:t>
+            </a:r>
+          </a:p>
+          <a:p>
+            <a:pPr marL="171450" indent="-171450">
+              <a:buFont typeface="Arial" panose="020B0604020202020204" pitchFamily="34" charset="0"/>
+              <a:buChar char="•"/>
+            </a:pPr>
+            <a:r>
+              <a:rPr lang="en-GB" dirty="0"/>
+              <a:t>So I considered the ones that were asking for less than 100,000 dollars and this is what I got</a:t>
+            </a:r>
+          </a:p>
+        </p:txBody>
+      </p:sp>
+      <p:sp>
+        <p:nvSpPr>
+          <p:cNvPr id="4" name="Slide Number Placeholder 3"/>
+          <p:cNvSpPr>
+            <a:spLocks noGrp="1"/>
+          </p:cNvSpPr>
+          <p:nvPr>
+            <p:ph type="sldNum" sz="quarter" idx="5"/>
+          </p:nvPr>
+        </p:nvSpPr>
+        <p:spPr/>
+        <p:txBody>
+          <a:bodyPr/>
+          <a:lstStyle/>
+          <a:p>
+            <a:fld id="{C2790DFA-B98D-46A3-A997-8D3A39E1F485}" type="slidenum">
+              <a:rPr lang="en-GB" smtClean="0"/>
+              <a:t>10</a:t>
+            </a:fld>
+            <a:endParaRPr lang="en-GB"/>
+          </a:p>
+        </p:txBody>
+      </p:sp>
+    </p:spTree>
+    <p:extLst>
+      <p:ext uri="{BB962C8B-B14F-4D97-AF65-F5344CB8AC3E}">
+        <p14:creationId xmlns:p14="http://schemas.microsoft.com/office/powerpoint/2010/main" val="3198911"/>
+      </p:ext>
+    </p:extLst>
+  </p:cSld>
+  <p:clrMapOvr>
+    <a:masterClrMapping/>
+  </p:clrMapOvr>
+</p:notes>
+</file>
+
+<file path=ppt/notesSlides/notesSlide11.xml><?xml version="1.0" encoding="utf-8"?>
+<p:notes xmlns:a="http://schemas.openxmlformats.org/drawingml/2006/main" xmlns:r="http://schemas.openxmlformats.org/officeDocument/2006/relationships" xmlns:p="http://schemas.openxmlformats.org/presentationml/2006/main">
+  <p:cSld>
+    <p:spTree>
+      <p:nvGrpSpPr>
+        <p:cNvPr id="1" name=""/>
+        <p:cNvGrpSpPr/>
+        <p:nvPr/>
+      </p:nvGrpSpPr>
+      <p:grpSpPr>
+        <a:xfrm>
+          <a:off x="0" y="0"/>
+          <a:ext cx="0" cy="0"/>
+          <a:chOff x="0" y="0"/>
+          <a:chExt cx="0" cy="0"/>
+        </a:xfrm>
+      </p:grpSpPr>
+      <p:sp>
+        <p:nvSpPr>
+          <p:cNvPr id="2" name="Slide Image Placeholder 1"/>
+          <p:cNvSpPr>
+            <a:spLocks noGrp="1" noRot="1" noChangeAspect="1"/>
+          </p:cNvSpPr>
+          <p:nvPr>
+            <p:ph type="sldImg"/>
+          </p:nvPr>
+        </p:nvSpPr>
+        <p:spPr/>
+      </p:sp>
+      <p:sp>
+        <p:nvSpPr>
+          <p:cNvPr id="3" name="Notes Placeholder 2"/>
+          <p:cNvSpPr>
+            <a:spLocks noGrp="1"/>
+          </p:cNvSpPr>
+          <p:nvPr>
+            <p:ph type="body" idx="1"/>
+          </p:nvPr>
+        </p:nvSpPr>
+        <p:spPr/>
+        <p:txBody>
+          <a:bodyPr/>
+          <a:lstStyle/>
+          <a:p>
+            <a:endParaRPr lang="en-GB" dirty="0"/>
+          </a:p>
+        </p:txBody>
+      </p:sp>
+      <p:sp>
+        <p:nvSpPr>
+          <p:cNvPr id="4" name="Slide Number Placeholder 3"/>
+          <p:cNvSpPr>
+            <a:spLocks noGrp="1"/>
+          </p:cNvSpPr>
+          <p:nvPr>
+            <p:ph type="sldNum" sz="quarter" idx="5"/>
+          </p:nvPr>
+        </p:nvSpPr>
+        <p:spPr/>
+        <p:txBody>
+          <a:bodyPr/>
+          <a:lstStyle/>
+          <a:p>
+            <a:fld id="{C2790DFA-B98D-46A3-A997-8D3A39E1F485}" type="slidenum">
+              <a:rPr lang="en-GB" smtClean="0"/>
+              <a:t>11</a:t>
+            </a:fld>
+            <a:endParaRPr lang="en-GB"/>
+          </a:p>
+        </p:txBody>
+      </p:sp>
+    </p:spTree>
+    <p:extLst>
+      <p:ext uri="{BB962C8B-B14F-4D97-AF65-F5344CB8AC3E}">
+        <p14:creationId xmlns:p14="http://schemas.microsoft.com/office/powerpoint/2010/main" val="1328932129"/>
+      </p:ext>
+    </p:extLst>
+  </p:cSld>
+  <p:clrMapOvr>
+    <a:masterClrMapping/>
+  </p:clrMapOvr>
+</p:notes>
+</file>
+
 <file path=ppt/notesSlides/notesSlide2.xml><?xml version="1.0" encoding="utf-8"?>
 <p:notes xmlns:a="http://schemas.openxmlformats.org/drawingml/2006/main" xmlns:r="http://schemas.openxmlformats.org/officeDocument/2006/relationships" xmlns:p="http://schemas.openxmlformats.org/presentationml/2006/main">
   <p:cSld>
@@ -1315,11 +1542,166 @@
             </a:pPr>
             <a:r>
               <a:rPr lang="en-GB" dirty="0"/>
-              <a:t>So here we can see that there are just so many failed projects that it is hard to see </a:t>
-            </a:r>
-            <a:r>
-              <a:rPr lang="en-GB"/>
-              <a:t>any comparisons</a:t>
+              <a:t>So here we can see that there are just so many failed projects that it is hard to see any comparisons</a:t>
+            </a:r>
+          </a:p>
+          <a:p>
+            <a:pPr marL="171450" indent="-171450">
+              <a:buFont typeface="Arial" panose="020B0604020202020204" pitchFamily="34" charset="0"/>
+              <a:buChar char="•"/>
+            </a:pPr>
+            <a:r>
+              <a:rPr lang="en-GB" dirty="0"/>
+              <a:t>So now if we look at the failures:</a:t>
+            </a:r>
+          </a:p>
+          <a:p>
+            <a:pPr marL="171450" indent="-171450">
+              <a:buFont typeface="Arial" panose="020B0604020202020204" pitchFamily="34" charset="0"/>
+              <a:buChar char="•"/>
+            </a:pPr>
+            <a:r>
+              <a:rPr lang="en-GB" dirty="0"/>
+              <a:t>Some campaigns got lots of backers and still failed whereas some got none, well most got none </a:t>
+            </a:r>
+          </a:p>
+          <a:p>
+            <a:pPr marL="171450" indent="-171450">
+              <a:buFont typeface="Arial" panose="020B0604020202020204" pitchFamily="34" charset="0"/>
+              <a:buChar char="•"/>
+            </a:pPr>
+            <a:r>
+              <a:rPr lang="en-GB" dirty="0"/>
+              <a:t>So then I thought lets consider the ones who have actually got a fair amount of backers, and see where they went wrong</a:t>
+            </a:r>
+          </a:p>
+        </p:txBody>
+      </p:sp>
+      <p:sp>
+        <p:nvSpPr>
+          <p:cNvPr id="4" name="Slide Number Placeholder 3"/>
+          <p:cNvSpPr>
+            <a:spLocks noGrp="1"/>
+          </p:cNvSpPr>
+          <p:nvPr>
+            <p:ph type="sldNum" sz="quarter" idx="5"/>
+          </p:nvPr>
+        </p:nvSpPr>
+        <p:spPr/>
+        <p:txBody>
+          <a:bodyPr/>
+          <a:lstStyle/>
+          <a:p>
+            <a:fld id="{C2790DFA-B98D-46A3-A997-8D3A39E1F485}" type="slidenum">
+              <a:rPr lang="en-GB" smtClean="0"/>
+              <a:t>7</a:t>
+            </a:fld>
+            <a:endParaRPr lang="en-GB"/>
+          </a:p>
+        </p:txBody>
+      </p:sp>
+    </p:spTree>
+    <p:extLst>
+      <p:ext uri="{BB962C8B-B14F-4D97-AF65-F5344CB8AC3E}">
+        <p14:creationId xmlns:p14="http://schemas.microsoft.com/office/powerpoint/2010/main" val="1230060995"/>
+      </p:ext>
+    </p:extLst>
+  </p:cSld>
+  <p:clrMapOvr>
+    <a:masterClrMapping/>
+  </p:clrMapOvr>
+</p:notes>
+</file>
+
+<file path=ppt/notesSlides/notesSlide8.xml><?xml version="1.0" encoding="utf-8"?>
+<p:notes xmlns:a="http://schemas.openxmlformats.org/drawingml/2006/main" xmlns:r="http://schemas.openxmlformats.org/officeDocument/2006/relationships" xmlns:p="http://schemas.openxmlformats.org/presentationml/2006/main">
+  <p:cSld>
+    <p:spTree>
+      <p:nvGrpSpPr>
+        <p:cNvPr id="1" name=""/>
+        <p:cNvGrpSpPr/>
+        <p:nvPr/>
+      </p:nvGrpSpPr>
+      <p:grpSpPr>
+        <a:xfrm>
+          <a:off x="0" y="0"/>
+          <a:ext cx="0" cy="0"/>
+          <a:chOff x="0" y="0"/>
+          <a:chExt cx="0" cy="0"/>
+        </a:xfrm>
+      </p:grpSpPr>
+      <p:sp>
+        <p:nvSpPr>
+          <p:cNvPr id="2" name="Slide Image Placeholder 1"/>
+          <p:cNvSpPr>
+            <a:spLocks noGrp="1" noRot="1" noChangeAspect="1"/>
+          </p:cNvSpPr>
+          <p:nvPr>
+            <p:ph type="sldImg"/>
+          </p:nvPr>
+        </p:nvSpPr>
+        <p:spPr/>
+      </p:sp>
+      <p:sp>
+        <p:nvSpPr>
+          <p:cNvPr id="3" name="Notes Placeholder 2"/>
+          <p:cNvSpPr>
+            <a:spLocks noGrp="1"/>
+          </p:cNvSpPr>
+          <p:nvPr>
+            <p:ph type="body" idx="1"/>
+          </p:nvPr>
+        </p:nvSpPr>
+        <p:spPr/>
+        <p:txBody>
+          <a:bodyPr/>
+          <a:lstStyle/>
+          <a:p>
+            <a:pPr marL="171450" indent="-171450">
+              <a:buFont typeface="Arial" panose="020B0604020202020204" pitchFamily="34" charset="0"/>
+              <a:buChar char="•"/>
+            </a:pPr>
+            <a:r>
+              <a:rPr lang="en-GB" dirty="0"/>
+              <a:t>So I thought if you’ve got all this support how can you fail</a:t>
+            </a:r>
+          </a:p>
+          <a:p>
+            <a:pPr marL="171450" indent="-171450">
+              <a:buFont typeface="Arial" panose="020B0604020202020204" pitchFamily="34" charset="0"/>
+              <a:buChar char="•"/>
+            </a:pPr>
+            <a:r>
+              <a:rPr lang="en-GB" dirty="0"/>
+              <a:t>Maybe people were just donating one or two dollars here and there</a:t>
+            </a:r>
+          </a:p>
+          <a:p>
+            <a:pPr marL="171450" indent="-171450">
+              <a:buFont typeface="Arial" panose="020B0604020202020204" pitchFamily="34" charset="0"/>
+              <a:buChar char="•"/>
+            </a:pPr>
+            <a:r>
+              <a:rPr lang="en-GB" dirty="0"/>
+              <a:t>But maybe your goal is </a:t>
+            </a:r>
+            <a:r>
+              <a:rPr lang="en-GB" dirty="0" err="1"/>
+              <a:t>wayyyyy</a:t>
+            </a:r>
+            <a:r>
+              <a:rPr lang="en-GB" dirty="0"/>
+              <a:t> too high</a:t>
+            </a:r>
+          </a:p>
+          <a:p>
+            <a:pPr marL="171450" indent="-171450">
+              <a:buFont typeface="Arial" panose="020B0604020202020204" pitchFamily="34" charset="0"/>
+              <a:buChar char="•"/>
+            </a:pPr>
+            <a:r>
+              <a:rPr lang="en-GB" dirty="0"/>
+              <a:t>I think this maybe links back to the idea of a minimum viable product</a:t>
             </a:r>
           </a:p>
           <a:p>
@@ -1348,7 +1730,7 @@
           <a:p>
             <a:fld id="{C2790DFA-B98D-46A3-A997-8D3A39E1F485}" type="slidenum">
               <a:rPr lang="en-GB" smtClean="0"/>
-              <a:t>7</a:t>
+              <a:t>8</a:t>
             </a:fld>
             <a:endParaRPr lang="en-GB"/>
           </a:p>
@@ -1357,7 +1739,157 @@
     </p:spTree>
     <p:extLst>
       <p:ext uri="{BB962C8B-B14F-4D97-AF65-F5344CB8AC3E}">
-        <p14:creationId xmlns:p14="http://schemas.microsoft.com/office/powerpoint/2010/main" val="1230060995"/>
+        <p14:creationId xmlns:p14="http://schemas.microsoft.com/office/powerpoint/2010/main" val="2297254664"/>
+      </p:ext>
+    </p:extLst>
+  </p:cSld>
+  <p:clrMapOvr>
+    <a:masterClrMapping/>
+  </p:clrMapOvr>
+</p:notes>
+</file>
+
+<file path=ppt/notesSlides/notesSlide9.xml><?xml version="1.0" encoding="utf-8"?>
+<p:notes xmlns:a="http://schemas.openxmlformats.org/drawingml/2006/main" xmlns:r="http://schemas.openxmlformats.org/officeDocument/2006/relationships" xmlns:p="http://schemas.openxmlformats.org/presentationml/2006/main">
+  <p:cSld>
+    <p:spTree>
+      <p:nvGrpSpPr>
+        <p:cNvPr id="1" name=""/>
+        <p:cNvGrpSpPr/>
+        <p:nvPr/>
+      </p:nvGrpSpPr>
+      <p:grpSpPr>
+        <a:xfrm>
+          <a:off x="0" y="0"/>
+          <a:ext cx="0" cy="0"/>
+          <a:chOff x="0" y="0"/>
+          <a:chExt cx="0" cy="0"/>
+        </a:xfrm>
+      </p:grpSpPr>
+      <p:sp>
+        <p:nvSpPr>
+          <p:cNvPr id="2" name="Slide Image Placeholder 1"/>
+          <p:cNvSpPr>
+            <a:spLocks noGrp="1" noRot="1" noChangeAspect="1"/>
+          </p:cNvSpPr>
+          <p:nvPr>
+            <p:ph type="sldImg"/>
+          </p:nvPr>
+        </p:nvSpPr>
+        <p:spPr/>
+      </p:sp>
+      <p:sp>
+        <p:nvSpPr>
+          <p:cNvPr id="3" name="Notes Placeholder 2"/>
+          <p:cNvSpPr>
+            <a:spLocks noGrp="1"/>
+          </p:cNvSpPr>
+          <p:nvPr>
+            <p:ph type="body" idx="1"/>
+          </p:nvPr>
+        </p:nvSpPr>
+        <p:spPr/>
+        <p:txBody>
+          <a:bodyPr/>
+          <a:lstStyle/>
+          <a:p>
+            <a:pPr marL="171450" indent="-171450">
+              <a:buFont typeface="Arial" panose="020B0604020202020204" pitchFamily="34" charset="0"/>
+              <a:buChar char="•"/>
+            </a:pPr>
+            <a:r>
+              <a:rPr lang="en-GB" dirty="0"/>
+              <a:t>So I plotted the ones with more than 100 backers, and saw how high their goal amount was</a:t>
+            </a:r>
+          </a:p>
+          <a:p>
+            <a:pPr marL="171450" indent="-171450">
+              <a:buFont typeface="Arial" panose="020B0604020202020204" pitchFamily="34" charset="0"/>
+              <a:buChar char="•"/>
+            </a:pPr>
+            <a:r>
+              <a:rPr lang="en-GB" dirty="0"/>
+              <a:t>And then of course there was one campaign with a goal of 30 million, who wanted to build a death star</a:t>
+            </a:r>
+          </a:p>
+          <a:p>
+            <a:pPr marL="171450" indent="-171450">
+              <a:buFont typeface="Arial" panose="020B0604020202020204" pitchFamily="34" charset="0"/>
+              <a:buChar char="•"/>
+            </a:pPr>
+            <a:r>
+              <a:rPr lang="en-GB" dirty="0"/>
+              <a:t>For which in the risks section the owner had written and I quote “</a:t>
+            </a:r>
+            <a:r>
+              <a:rPr lang="en-GB" sz="1200" b="0" i="0" kern="1200" dirty="0">
+                <a:solidFill>
+                  <a:schemeClr val="tx1"/>
+                </a:solidFill>
+                <a:effectLst/>
+                <a:latin typeface="+mn-lt"/>
+                <a:ea typeface="+mn-ea"/>
+                <a:cs typeface="+mn-cs"/>
+              </a:rPr>
+              <a:t>The only risk is the power of the Force..</a:t>
+            </a:r>
+            <a:r>
+              <a:rPr lang="en-GB" dirty="0"/>
+              <a:t>”</a:t>
+            </a:r>
+          </a:p>
+          <a:p>
+            <a:pPr marL="171450" indent="-171450">
+              <a:buFont typeface="Arial" panose="020B0604020202020204" pitchFamily="34" charset="0"/>
+              <a:buChar char="•"/>
+            </a:pPr>
+            <a:r>
+              <a:rPr lang="en-GB" dirty="0"/>
+              <a:t>Guess what was the second highest goal</a:t>
+            </a:r>
+          </a:p>
+          <a:p>
+            <a:pPr marL="171450" indent="-171450">
+              <a:buFont typeface="Arial" panose="020B0604020202020204" pitchFamily="34" charset="0"/>
+              <a:buChar char="•"/>
+            </a:pPr>
+            <a:r>
+              <a:rPr lang="en-GB" dirty="0"/>
+              <a:t>‘Rebel Alliance X-Wing Squadron’ which had a goal of only 11 million</a:t>
+            </a:r>
+          </a:p>
+          <a:p>
+            <a:endParaRPr lang="en-GB" dirty="0"/>
+          </a:p>
+        </p:txBody>
+      </p:sp>
+      <p:sp>
+        <p:nvSpPr>
+          <p:cNvPr id="4" name="Slide Number Placeholder 3"/>
+          <p:cNvSpPr>
+            <a:spLocks noGrp="1"/>
+          </p:cNvSpPr>
+          <p:nvPr>
+            <p:ph type="sldNum" sz="quarter" idx="5"/>
+          </p:nvPr>
+        </p:nvSpPr>
+        <p:spPr/>
+        <p:txBody>
+          <a:bodyPr/>
+          <a:lstStyle/>
+          <a:p>
+            <a:fld id="{C2790DFA-B98D-46A3-A997-8D3A39E1F485}" type="slidenum">
+              <a:rPr lang="en-GB" smtClean="0"/>
+              <a:t>9</a:t>
+            </a:fld>
+            <a:endParaRPr lang="en-GB"/>
+          </a:p>
+        </p:txBody>
+      </p:sp>
+    </p:spTree>
+    <p:extLst>
+      <p:ext uri="{BB962C8B-B14F-4D97-AF65-F5344CB8AC3E}">
+        <p14:creationId xmlns:p14="http://schemas.microsoft.com/office/powerpoint/2010/main" val="4023689483"/>
       </p:ext>
     </p:extLst>
   </p:cSld>
@@ -4643,6 +5175,122 @@
 </p:sld>
 </file>
 
+<file path=ppt/slides/slide10.xml><?xml version="1.0" encoding="utf-8"?>
+<p:sld xmlns:a="http://schemas.openxmlformats.org/drawingml/2006/main" xmlns:r="http://schemas.openxmlformats.org/officeDocument/2006/relationships" xmlns:p="http://schemas.openxmlformats.org/presentationml/2006/main">
+  <p:cSld>
+    <p:spTree>
+      <p:nvGrpSpPr>
+        <p:cNvPr id="1" name=""/>
+        <p:cNvGrpSpPr/>
+        <p:nvPr/>
+      </p:nvGrpSpPr>
+      <p:grpSpPr>
+        <a:xfrm>
+          <a:off x="0" y="0"/>
+          <a:ext cx="0" cy="0"/>
+          <a:chOff x="0" y="0"/>
+          <a:chExt cx="0" cy="0"/>
+        </a:xfrm>
+      </p:grpSpPr>
+      <p:sp>
+        <p:nvSpPr>
+          <p:cNvPr id="2" name="Title 1">
+            <a:extLst>
+              <a:ext uri="{FF2B5EF4-FFF2-40B4-BE49-F238E27FC236}">
+                <a16:creationId xmlns:a16="http://schemas.microsoft.com/office/drawing/2014/main" id="{600A599C-FD24-4CD4-A5FE-068B91CC9E4E}"/>
+              </a:ext>
+            </a:extLst>
+          </p:cNvPr>
+          <p:cNvSpPr>
+            <a:spLocks noGrp="1"/>
+          </p:cNvSpPr>
+          <p:nvPr>
+            <p:ph type="title"/>
+          </p:nvPr>
+        </p:nvSpPr>
+        <p:spPr/>
+        <p:txBody>
+          <a:bodyPr/>
+          <a:lstStyle/>
+          <a:p>
+            <a:r>
+              <a:rPr lang="en-GB" dirty="0"/>
+              <a:t>table</a:t>
+            </a:r>
+          </a:p>
+        </p:txBody>
+      </p:sp>
+    </p:spTree>
+    <p:extLst>
+      <p:ext uri="{BB962C8B-B14F-4D97-AF65-F5344CB8AC3E}">
+        <p14:creationId xmlns:p14="http://schemas.microsoft.com/office/powerpoint/2010/main" val="2832138813"/>
+      </p:ext>
+    </p:extLst>
+  </p:cSld>
+  <p:clrMapOvr>
+    <a:masterClrMapping/>
+  </p:clrMapOvr>
+</p:sld>
+</file>
+
+<file path=ppt/slides/slide11.xml><?xml version="1.0" encoding="utf-8"?>
+<p:sld xmlns:a="http://schemas.openxmlformats.org/drawingml/2006/main" xmlns:r="http://schemas.openxmlformats.org/officeDocument/2006/relationships" xmlns:p="http://schemas.openxmlformats.org/presentationml/2006/main">
+  <p:cSld>
+    <p:spTree>
+      <p:nvGrpSpPr>
+        <p:cNvPr id="1" name=""/>
+        <p:cNvGrpSpPr/>
+        <p:nvPr/>
+      </p:nvGrpSpPr>
+      <p:grpSpPr>
+        <a:xfrm>
+          <a:off x="0" y="0"/>
+          <a:ext cx="0" cy="0"/>
+          <a:chOff x="0" y="0"/>
+          <a:chExt cx="0" cy="0"/>
+        </a:xfrm>
+      </p:grpSpPr>
+      <p:sp>
+        <p:nvSpPr>
+          <p:cNvPr id="2" name="Title 1">
+            <a:extLst>
+              <a:ext uri="{FF2B5EF4-FFF2-40B4-BE49-F238E27FC236}">
+                <a16:creationId xmlns:a16="http://schemas.microsoft.com/office/drawing/2014/main" id="{B23CF710-8E9C-4D5A-A246-AEC4CDD5F349}"/>
+              </a:ext>
+            </a:extLst>
+          </p:cNvPr>
+          <p:cNvSpPr>
+            <a:spLocks noGrp="1"/>
+          </p:cNvSpPr>
+          <p:nvPr>
+            <p:ph type="title"/>
+          </p:nvPr>
+        </p:nvSpPr>
+        <p:spPr/>
+        <p:txBody>
+          <a:bodyPr/>
+          <a:lstStyle/>
+          <a:p>
+            <a:r>
+              <a:rPr lang="en-GB" dirty="0"/>
+              <a:t>Back to comparison with the successes</a:t>
+            </a:r>
+          </a:p>
+        </p:txBody>
+      </p:sp>
+    </p:spTree>
+    <p:extLst>
+      <p:ext uri="{BB962C8B-B14F-4D97-AF65-F5344CB8AC3E}">
+        <p14:creationId xmlns:p14="http://schemas.microsoft.com/office/powerpoint/2010/main" val="3779294912"/>
+      </p:ext>
+    </p:extLst>
+  </p:cSld>
+  <p:clrMapOvr>
+    <a:masterClrMapping/>
+  </p:clrMapOvr>
+</p:sld>
+</file>
+
 <file path=ppt/slides/slide2.xml><?xml version="1.0" encoding="utf-8"?>
 <p:sld xmlns:a="http://schemas.openxmlformats.org/drawingml/2006/main" xmlns:r="http://schemas.openxmlformats.org/officeDocument/2006/relationships" xmlns:p="http://schemas.openxmlformats.org/presentationml/2006/main">
   <p:cSld>
@@ -4994,7 +5642,7 @@
           <a:p>
             <a:r>
               <a:rPr lang="en-GB" dirty="0"/>
-              <a:t>histogram</a:t>
+              <a:t>histograms</a:t>
             </a:r>
           </a:p>
         </p:txBody>
@@ -5003,6 +5651,126 @@
     <p:extLst>
       <p:ext uri="{BB962C8B-B14F-4D97-AF65-F5344CB8AC3E}">
         <p14:creationId xmlns:p14="http://schemas.microsoft.com/office/powerpoint/2010/main" val="1863912673"/>
+      </p:ext>
+    </p:extLst>
+  </p:cSld>
+  <p:clrMapOvr>
+    <a:masterClrMapping/>
+  </p:clrMapOvr>
+</p:sld>
+</file>
+
+<file path=ppt/slides/slide8.xml><?xml version="1.0" encoding="utf-8"?>
+<p:sld xmlns:a="http://schemas.openxmlformats.org/drawingml/2006/main" xmlns:r="http://schemas.openxmlformats.org/officeDocument/2006/relationships" xmlns:p="http://schemas.openxmlformats.org/presentationml/2006/main">
+  <p:cSld>
+    <p:spTree>
+      <p:nvGrpSpPr>
+        <p:cNvPr id="1" name=""/>
+        <p:cNvGrpSpPr/>
+        <p:nvPr/>
+      </p:nvGrpSpPr>
+      <p:grpSpPr>
+        <a:xfrm>
+          <a:off x="0" y="0"/>
+          <a:ext cx="0" cy="0"/>
+          <a:chOff x="0" y="0"/>
+          <a:chExt cx="0" cy="0"/>
+        </a:xfrm>
+      </p:grpSpPr>
+      <p:sp>
+        <p:nvSpPr>
+          <p:cNvPr id="2" name="Title 1">
+            <a:extLst>
+              <a:ext uri="{FF2B5EF4-FFF2-40B4-BE49-F238E27FC236}">
+                <a16:creationId xmlns:a16="http://schemas.microsoft.com/office/drawing/2014/main" id="{E0D437F7-B5EB-4662-AC2C-261BA7538117}"/>
+              </a:ext>
+            </a:extLst>
+          </p:cNvPr>
+          <p:cNvSpPr>
+            <a:spLocks noGrp="1"/>
+          </p:cNvSpPr>
+          <p:nvPr>
+            <p:ph type="title"/>
+          </p:nvPr>
+        </p:nvSpPr>
+        <p:spPr/>
+        <p:txBody>
+          <a:bodyPr/>
+          <a:lstStyle/>
+          <a:p>
+            <a:r>
+              <a:rPr lang="en-GB" dirty="0"/>
+              <a:t>Failures by engagement</a:t>
+            </a:r>
+          </a:p>
+        </p:txBody>
+      </p:sp>
+    </p:spTree>
+    <p:extLst>
+      <p:ext uri="{BB962C8B-B14F-4D97-AF65-F5344CB8AC3E}">
+        <p14:creationId xmlns:p14="http://schemas.microsoft.com/office/powerpoint/2010/main" val="3930068610"/>
+      </p:ext>
+    </p:extLst>
+  </p:cSld>
+  <p:clrMapOvr>
+    <a:masterClrMapping/>
+  </p:clrMapOvr>
+</p:sld>
+</file>
+
+<file path=ppt/slides/slide9.xml><?xml version="1.0" encoding="utf-8"?>
+<p:sld xmlns:a="http://schemas.openxmlformats.org/drawingml/2006/main" xmlns:r="http://schemas.openxmlformats.org/officeDocument/2006/relationships" xmlns:p="http://schemas.openxmlformats.org/presentationml/2006/main">
+  <p:cSld>
+    <p:spTree>
+      <p:nvGrpSpPr>
+        <p:cNvPr id="1" name=""/>
+        <p:cNvGrpSpPr/>
+        <p:nvPr/>
+      </p:nvGrpSpPr>
+      <p:grpSpPr>
+        <a:xfrm>
+          <a:off x="0" y="0"/>
+          <a:ext cx="0" cy="0"/>
+          <a:chOff x="0" y="0"/>
+          <a:chExt cx="0" cy="0"/>
+        </a:xfrm>
+      </p:grpSpPr>
+      <p:sp>
+        <p:nvSpPr>
+          <p:cNvPr id="2" name="Title 1">
+            <a:extLst>
+              <a:ext uri="{FF2B5EF4-FFF2-40B4-BE49-F238E27FC236}">
+                <a16:creationId xmlns:a16="http://schemas.microsoft.com/office/drawing/2014/main" id="{8F3A80BE-D91C-45B0-B0F4-510C1E1445FF}"/>
+              </a:ext>
+            </a:extLst>
+          </p:cNvPr>
+          <p:cNvSpPr>
+            <a:spLocks noGrp="1"/>
+          </p:cNvSpPr>
+          <p:nvPr>
+            <p:ph type="title"/>
+          </p:nvPr>
+        </p:nvSpPr>
+        <p:spPr/>
+        <p:txBody>
+          <a:bodyPr/>
+          <a:lstStyle/>
+          <a:p>
+            <a:r>
+              <a:rPr lang="en-GB" dirty="0"/>
+              <a:t>Star wars</a:t>
+            </a:r>
+            <a:br>
+              <a:rPr lang="en-GB" dirty="0"/>
+            </a:br>
+            <a:endParaRPr lang="en-GB" dirty="0"/>
+          </a:p>
+        </p:txBody>
+      </p:sp>
+    </p:spTree>
+    <p:extLst>
+      <p:ext uri="{BB962C8B-B14F-4D97-AF65-F5344CB8AC3E}">
+        <p14:creationId xmlns:p14="http://schemas.microsoft.com/office/powerpoint/2010/main" val="2854809761"/>
       </p:ext>
     </p:extLst>
   </p:cSld>

</xml_diff>

<commit_message>
dinner break, making heatmap
</commit_message>
<xml_diff>
--- a/Page 1.pptx
+++ b/Page 1.pptx
@@ -5,7 +5,7 @@
     <p:sldMasterId id="2147483648" r:id="rId1"/>
   </p:sldMasterIdLst>
   <p:notesMasterIdLst>
-    <p:notesMasterId r:id="rId13"/>
+    <p:notesMasterId r:id="rId14"/>
   </p:notesMasterIdLst>
   <p:sldIdLst>
     <p:sldId id="256" r:id="rId2"/>
@@ -19,6 +19,7 @@
     <p:sldId id="264" r:id="rId10"/>
     <p:sldId id="265" r:id="rId11"/>
     <p:sldId id="266" r:id="rId12"/>
+    <p:sldId id="267" r:id="rId13"/>
   </p:sldIdLst>
   <p:sldSz cx="12192000" cy="6858000"/>
   <p:notesSz cx="6858000" cy="9144000"/>
@@ -855,6 +856,16 @@
             </a:pPr>
             <a:r>
               <a:rPr lang="en-GB" dirty="0"/>
+              <a:t>I did an overlay too, but because of the vast difference in quantities it isn’t very easy to see</a:t>
+            </a:r>
+          </a:p>
+          <a:p>
+            <a:pPr marL="171450" indent="-171450">
+              <a:buFont typeface="Arial" panose="020B0604020202020204" pitchFamily="34" charset="0"/>
+              <a:buChar char="•"/>
+            </a:pPr>
+            <a:r>
+              <a:rPr lang="en-GB" dirty="0"/>
               <a:t>Should you play the system and ask for barely any money like some of the successful campaigns did just so that you get your money ?</a:t>
             </a:r>
           </a:p>
@@ -887,6 +898,141 @@
     <p:extLst>
       <p:ext uri="{BB962C8B-B14F-4D97-AF65-F5344CB8AC3E}">
         <p14:creationId xmlns:p14="http://schemas.microsoft.com/office/powerpoint/2010/main" val="1328932129"/>
+      </p:ext>
+    </p:extLst>
+  </p:cSld>
+  <p:clrMapOvr>
+    <a:masterClrMapping/>
+  </p:clrMapOvr>
+</p:notes>
+</file>
+
+<file path=ppt/notesSlides/notesSlide12.xml><?xml version="1.0" encoding="utf-8"?>
+<p:notes xmlns:a="http://schemas.openxmlformats.org/drawingml/2006/main" xmlns:r="http://schemas.openxmlformats.org/officeDocument/2006/relationships" xmlns:p="http://schemas.openxmlformats.org/presentationml/2006/main">
+  <p:cSld>
+    <p:spTree>
+      <p:nvGrpSpPr>
+        <p:cNvPr id="1" name=""/>
+        <p:cNvGrpSpPr/>
+        <p:nvPr/>
+      </p:nvGrpSpPr>
+      <p:grpSpPr>
+        <a:xfrm>
+          <a:off x="0" y="0"/>
+          <a:ext cx="0" cy="0"/>
+          <a:chOff x="0" y="0"/>
+          <a:chExt cx="0" cy="0"/>
+        </a:xfrm>
+      </p:grpSpPr>
+      <p:sp>
+        <p:nvSpPr>
+          <p:cNvPr id="2" name="Slide Image Placeholder 1"/>
+          <p:cNvSpPr>
+            <a:spLocks noGrp="1" noRot="1" noChangeAspect="1"/>
+          </p:cNvSpPr>
+          <p:nvPr>
+            <p:ph type="sldImg"/>
+          </p:nvPr>
+        </p:nvSpPr>
+        <p:spPr/>
+      </p:sp>
+      <p:sp>
+        <p:nvSpPr>
+          <p:cNvPr id="3" name="Notes Placeholder 2"/>
+          <p:cNvSpPr>
+            <a:spLocks noGrp="1"/>
+          </p:cNvSpPr>
+          <p:nvPr>
+            <p:ph type="body" idx="1"/>
+          </p:nvPr>
+        </p:nvSpPr>
+        <p:spPr/>
+        <p:txBody>
+          <a:bodyPr/>
+          <a:lstStyle/>
+          <a:p>
+            <a:pPr marL="171450" indent="-171450">
+              <a:buFont typeface="Arial" panose="020B0604020202020204" pitchFamily="34" charset="0"/>
+              <a:buChar char="•"/>
+            </a:pPr>
+            <a:r>
+              <a:rPr lang="en-GB" dirty="0"/>
+              <a:t>If you have a low goal, do people keep giving after </a:t>
+            </a:r>
+            <a:r>
+              <a:rPr lang="en-GB" dirty="0" err="1"/>
+              <a:t>youve</a:t>
+            </a:r>
+            <a:r>
+              <a:rPr lang="en-GB" dirty="0"/>
+              <a:t> reached it ?</a:t>
+            </a:r>
+          </a:p>
+          <a:p>
+            <a:pPr marL="171450" indent="-171450">
+              <a:buFont typeface="Arial" panose="020B0604020202020204" pitchFamily="34" charset="0"/>
+              <a:buChar char="•"/>
+            </a:pPr>
+            <a:r>
+              <a:rPr lang="en-GB" dirty="0"/>
+              <a:t>So I found the bottom 5</a:t>
+            </a:r>
+            <a:r>
+              <a:rPr lang="en-GB" baseline="30000" dirty="0"/>
+              <a:t>th</a:t>
+            </a:r>
+            <a:r>
+              <a:rPr lang="en-GB" dirty="0"/>
+              <a:t> percentile for the </a:t>
+            </a:r>
+            <a:r>
+              <a:rPr lang="en-GB" dirty="0" err="1"/>
+              <a:t>usd</a:t>
+            </a:r>
+            <a:r>
+              <a:rPr lang="en-GB" dirty="0"/>
+              <a:t> goal real, which is the values smaller than $498</a:t>
+            </a:r>
+          </a:p>
+          <a:p>
+            <a:pPr marL="171450" indent="-171450">
+              <a:buFont typeface="Arial" panose="020B0604020202020204" pitchFamily="34" charset="0"/>
+              <a:buChar char="•"/>
+            </a:pPr>
+            <a:r>
+              <a:rPr lang="en-GB" dirty="0"/>
+              <a:t>There were 322 of these so I wanted to look into how much more than their goal they received </a:t>
+            </a:r>
+          </a:p>
+        </p:txBody>
+      </p:sp>
+      <p:sp>
+        <p:nvSpPr>
+          <p:cNvPr id="4" name="Slide Number Placeholder 3"/>
+          <p:cNvSpPr>
+            <a:spLocks noGrp="1"/>
+          </p:cNvSpPr>
+          <p:nvPr>
+            <p:ph type="sldNum" sz="quarter" idx="5"/>
+          </p:nvPr>
+        </p:nvSpPr>
+        <p:spPr/>
+        <p:txBody>
+          <a:bodyPr/>
+          <a:lstStyle/>
+          <a:p>
+            <a:fld id="{C2790DFA-B98D-46A3-A997-8D3A39E1F485}" type="slidenum">
+              <a:rPr lang="en-GB" smtClean="0"/>
+              <a:t>12</a:t>
+            </a:fld>
+            <a:endParaRPr lang="en-GB"/>
+          </a:p>
+        </p:txBody>
+      </p:sp>
+    </p:spTree>
+    <p:extLst>
+      <p:ext uri="{BB962C8B-B14F-4D97-AF65-F5344CB8AC3E}">
+        <p14:creationId xmlns:p14="http://schemas.microsoft.com/office/powerpoint/2010/main" val="200386866"/>
       </p:ext>
     </p:extLst>
   </p:cSld>
@@ -5337,6 +5483,64 @@
     <p:extLst>
       <p:ext uri="{BB962C8B-B14F-4D97-AF65-F5344CB8AC3E}">
         <p14:creationId xmlns:p14="http://schemas.microsoft.com/office/powerpoint/2010/main" val="3779294912"/>
+      </p:ext>
+    </p:extLst>
+  </p:cSld>
+  <p:clrMapOvr>
+    <a:masterClrMapping/>
+  </p:clrMapOvr>
+</p:sld>
+</file>
+
+<file path=ppt/slides/slide12.xml><?xml version="1.0" encoding="utf-8"?>
+<p:sld xmlns:a="http://schemas.openxmlformats.org/drawingml/2006/main" xmlns:r="http://schemas.openxmlformats.org/officeDocument/2006/relationships" xmlns:p="http://schemas.openxmlformats.org/presentationml/2006/main">
+  <p:cSld>
+    <p:spTree>
+      <p:nvGrpSpPr>
+        <p:cNvPr id="1" name=""/>
+        <p:cNvGrpSpPr/>
+        <p:nvPr/>
+      </p:nvGrpSpPr>
+      <p:grpSpPr>
+        <a:xfrm>
+          <a:off x="0" y="0"/>
+          <a:ext cx="0" cy="0"/>
+          <a:chOff x="0" y="0"/>
+          <a:chExt cx="0" cy="0"/>
+        </a:xfrm>
+      </p:grpSpPr>
+      <p:sp>
+        <p:nvSpPr>
+          <p:cNvPr id="3" name="Title 2">
+            <a:extLst>
+              <a:ext uri="{FF2B5EF4-FFF2-40B4-BE49-F238E27FC236}">
+                <a16:creationId xmlns:a16="http://schemas.microsoft.com/office/drawing/2014/main" id="{1B3334E9-FFBF-4ED0-AC9C-00DE62312122}"/>
+              </a:ext>
+            </a:extLst>
+          </p:cNvPr>
+          <p:cNvSpPr>
+            <a:spLocks noGrp="1"/>
+          </p:cNvSpPr>
+          <p:nvPr>
+            <p:ph type="title"/>
+          </p:nvPr>
+        </p:nvSpPr>
+        <p:spPr/>
+        <p:txBody>
+          <a:bodyPr/>
+          <a:lstStyle/>
+          <a:p>
+            <a:r>
+              <a:rPr lang="en-GB" dirty="0"/>
+              <a:t>Success low goals</a:t>
+            </a:r>
+          </a:p>
+        </p:txBody>
+      </p:sp>
+    </p:spTree>
+    <p:extLst>
+      <p:ext uri="{BB962C8B-B14F-4D97-AF65-F5344CB8AC3E}">
+        <p14:creationId xmlns:p14="http://schemas.microsoft.com/office/powerpoint/2010/main" val="356675881"/>
       </p:ext>
     </p:extLst>
   </p:cSld>

</xml_diff>